<commit_message>
Adding bad data slide
</commit_message>
<xml_diff>
--- a/Classifying Depression with Activity.pptx
+++ b/Classifying Depression with Activity.pptx
@@ -144,6 +144,2798 @@
 </p:presentation>
 </file>
 
+<file path=ppt/diagrams/colors1.xml><?xml version="1.0" encoding="utf-8"?>
+<dgm:colorsDef xmlns:dgm="http://schemas.openxmlformats.org/drawingml/2006/diagram" xmlns:a="http://schemas.openxmlformats.org/drawingml/2006/main" uniqueId="urn:microsoft.com/office/officeart/2005/8/colors/accent1_2">
+  <dgm:title val=""/>
+  <dgm:desc val=""/>
+  <dgm:catLst>
+    <dgm:cat type="accent1" pri="11200"/>
+  </dgm:catLst>
+  <dgm:styleLbl name="node0">
+    <dgm:fillClrLst meth="repeat">
+      <a:schemeClr val="accent1"/>
+    </dgm:fillClrLst>
+    <dgm:linClrLst meth="repeat">
+      <a:schemeClr val="lt1"/>
+    </dgm:linClrLst>
+    <dgm:effectClrLst/>
+    <dgm:txLinClrLst/>
+    <dgm:txFillClrLst/>
+    <dgm:txEffectClrLst/>
+  </dgm:styleLbl>
+  <dgm:styleLbl name="alignNode1">
+    <dgm:fillClrLst meth="repeat">
+      <a:schemeClr val="accent1"/>
+    </dgm:fillClrLst>
+    <dgm:linClrLst meth="repeat">
+      <a:schemeClr val="accent1"/>
+    </dgm:linClrLst>
+    <dgm:effectClrLst/>
+    <dgm:txLinClrLst/>
+    <dgm:txFillClrLst/>
+    <dgm:txEffectClrLst/>
+  </dgm:styleLbl>
+  <dgm:styleLbl name="node1">
+    <dgm:fillClrLst meth="repeat">
+      <a:schemeClr val="accent1"/>
+    </dgm:fillClrLst>
+    <dgm:linClrLst meth="repeat">
+      <a:schemeClr val="lt1"/>
+    </dgm:linClrLst>
+    <dgm:effectClrLst/>
+    <dgm:txLinClrLst/>
+    <dgm:txFillClrLst/>
+    <dgm:txEffectClrLst/>
+  </dgm:styleLbl>
+  <dgm:styleLbl name="lnNode1">
+    <dgm:fillClrLst meth="repeat">
+      <a:schemeClr val="accent1"/>
+    </dgm:fillClrLst>
+    <dgm:linClrLst meth="repeat">
+      <a:schemeClr val="lt1"/>
+    </dgm:linClrLst>
+    <dgm:effectClrLst/>
+    <dgm:txLinClrLst/>
+    <dgm:txFillClrLst/>
+    <dgm:txEffectClrLst/>
+  </dgm:styleLbl>
+  <dgm:styleLbl name="vennNode1">
+    <dgm:fillClrLst meth="repeat">
+      <a:schemeClr val="accent1">
+        <a:alpha val="50000"/>
+      </a:schemeClr>
+    </dgm:fillClrLst>
+    <dgm:linClrLst meth="repeat">
+      <a:schemeClr val="lt1"/>
+    </dgm:linClrLst>
+    <dgm:effectClrLst/>
+    <dgm:txLinClrLst/>
+    <dgm:txFillClrLst/>
+    <dgm:txEffectClrLst/>
+  </dgm:styleLbl>
+  <dgm:styleLbl name="node2">
+    <dgm:fillClrLst meth="repeat">
+      <a:schemeClr val="accent1"/>
+    </dgm:fillClrLst>
+    <dgm:linClrLst meth="repeat">
+      <a:schemeClr val="lt1"/>
+    </dgm:linClrLst>
+    <dgm:effectClrLst/>
+    <dgm:txLinClrLst/>
+    <dgm:txFillClrLst/>
+    <dgm:txEffectClrLst/>
+  </dgm:styleLbl>
+  <dgm:styleLbl name="node3">
+    <dgm:fillClrLst meth="repeat">
+      <a:schemeClr val="accent1"/>
+    </dgm:fillClrLst>
+    <dgm:linClrLst meth="repeat">
+      <a:schemeClr val="lt1"/>
+    </dgm:linClrLst>
+    <dgm:effectClrLst/>
+    <dgm:txLinClrLst/>
+    <dgm:txFillClrLst/>
+    <dgm:txEffectClrLst/>
+  </dgm:styleLbl>
+  <dgm:styleLbl name="node4">
+    <dgm:fillClrLst meth="repeat">
+      <a:schemeClr val="accent1"/>
+    </dgm:fillClrLst>
+    <dgm:linClrLst meth="repeat">
+      <a:schemeClr val="lt1"/>
+    </dgm:linClrLst>
+    <dgm:effectClrLst/>
+    <dgm:txLinClrLst/>
+    <dgm:txFillClrLst/>
+    <dgm:txEffectClrLst/>
+  </dgm:styleLbl>
+  <dgm:styleLbl name="fgImgPlace1">
+    <dgm:fillClrLst meth="repeat">
+      <a:schemeClr val="accent1">
+        <a:tint val="50000"/>
+      </a:schemeClr>
+    </dgm:fillClrLst>
+    <dgm:linClrLst meth="repeat">
+      <a:schemeClr val="lt1"/>
+    </dgm:linClrLst>
+    <dgm:effectClrLst/>
+    <dgm:txLinClrLst/>
+    <dgm:txFillClrLst meth="repeat">
+      <a:schemeClr val="lt1"/>
+    </dgm:txFillClrLst>
+    <dgm:txEffectClrLst/>
+  </dgm:styleLbl>
+  <dgm:styleLbl name="alignImgPlace1">
+    <dgm:fillClrLst meth="repeat">
+      <a:schemeClr val="accent1">
+        <a:tint val="50000"/>
+      </a:schemeClr>
+    </dgm:fillClrLst>
+    <dgm:linClrLst meth="repeat">
+      <a:schemeClr val="lt1"/>
+    </dgm:linClrLst>
+    <dgm:effectClrLst/>
+    <dgm:txLinClrLst/>
+    <dgm:txFillClrLst meth="repeat">
+      <a:schemeClr val="lt1"/>
+    </dgm:txFillClrLst>
+    <dgm:txEffectClrLst/>
+  </dgm:styleLbl>
+  <dgm:styleLbl name="bgImgPlace1">
+    <dgm:fillClrLst meth="repeat">
+      <a:schemeClr val="accent1">
+        <a:tint val="50000"/>
+      </a:schemeClr>
+    </dgm:fillClrLst>
+    <dgm:linClrLst meth="repeat">
+      <a:schemeClr val="lt1"/>
+    </dgm:linClrLst>
+    <dgm:effectClrLst/>
+    <dgm:txLinClrLst/>
+    <dgm:txFillClrLst meth="repeat">
+      <a:schemeClr val="lt1"/>
+    </dgm:txFillClrLst>
+    <dgm:txEffectClrLst/>
+  </dgm:styleLbl>
+  <dgm:styleLbl name="sibTrans2D1">
+    <dgm:fillClrLst meth="repeat">
+      <a:schemeClr val="accent1">
+        <a:tint val="60000"/>
+      </a:schemeClr>
+    </dgm:fillClrLst>
+    <dgm:linClrLst meth="repeat">
+      <a:schemeClr val="accent1">
+        <a:tint val="60000"/>
+      </a:schemeClr>
+    </dgm:linClrLst>
+    <dgm:effectClrLst/>
+    <dgm:txLinClrLst/>
+    <dgm:txFillClrLst/>
+    <dgm:txEffectClrLst/>
+  </dgm:styleLbl>
+  <dgm:styleLbl name="fgSibTrans2D1">
+    <dgm:fillClrLst meth="repeat">
+      <a:schemeClr val="accent1">
+        <a:tint val="60000"/>
+      </a:schemeClr>
+    </dgm:fillClrLst>
+    <dgm:linClrLst meth="repeat">
+      <a:schemeClr val="accent1">
+        <a:tint val="60000"/>
+      </a:schemeClr>
+    </dgm:linClrLst>
+    <dgm:effectClrLst/>
+    <dgm:txLinClrLst/>
+    <dgm:txFillClrLst/>
+    <dgm:txEffectClrLst/>
+  </dgm:styleLbl>
+  <dgm:styleLbl name="bgSibTrans2D1">
+    <dgm:fillClrLst meth="repeat">
+      <a:schemeClr val="accent1">
+        <a:tint val="60000"/>
+      </a:schemeClr>
+    </dgm:fillClrLst>
+    <dgm:linClrLst meth="repeat">
+      <a:schemeClr val="accent1">
+        <a:tint val="60000"/>
+      </a:schemeClr>
+    </dgm:linClrLst>
+    <dgm:effectClrLst/>
+    <dgm:txLinClrLst/>
+    <dgm:txFillClrLst/>
+    <dgm:txEffectClrLst/>
+  </dgm:styleLbl>
+  <dgm:styleLbl name="sibTrans1D1">
+    <dgm:fillClrLst meth="repeat">
+      <a:schemeClr val="accent1"/>
+    </dgm:fillClrLst>
+    <dgm:linClrLst meth="repeat">
+      <a:schemeClr val="accent1"/>
+    </dgm:linClrLst>
+    <dgm:effectClrLst/>
+    <dgm:txLinClrLst/>
+    <dgm:txFillClrLst meth="repeat">
+      <a:schemeClr val="tx1"/>
+    </dgm:txFillClrLst>
+    <dgm:txEffectClrLst/>
+  </dgm:styleLbl>
+  <dgm:styleLbl name="callout">
+    <dgm:fillClrLst meth="repeat">
+      <a:schemeClr val="accent1"/>
+    </dgm:fillClrLst>
+    <dgm:linClrLst meth="repeat">
+      <a:schemeClr val="accent1">
+        <a:tint val="50000"/>
+      </a:schemeClr>
+    </dgm:linClrLst>
+    <dgm:effectClrLst/>
+    <dgm:txLinClrLst/>
+    <dgm:txFillClrLst meth="repeat">
+      <a:schemeClr val="tx1"/>
+    </dgm:txFillClrLst>
+    <dgm:txEffectClrLst/>
+  </dgm:styleLbl>
+  <dgm:styleLbl name="asst0">
+    <dgm:fillClrLst meth="repeat">
+      <a:schemeClr val="accent1"/>
+    </dgm:fillClrLst>
+    <dgm:linClrLst meth="repeat">
+      <a:schemeClr val="lt1"/>
+    </dgm:linClrLst>
+    <dgm:effectClrLst/>
+    <dgm:txLinClrLst/>
+    <dgm:txFillClrLst/>
+    <dgm:txEffectClrLst/>
+  </dgm:styleLbl>
+  <dgm:styleLbl name="asst1">
+    <dgm:fillClrLst meth="repeat">
+      <a:schemeClr val="accent1"/>
+    </dgm:fillClrLst>
+    <dgm:linClrLst meth="repeat">
+      <a:schemeClr val="lt1"/>
+    </dgm:linClrLst>
+    <dgm:effectClrLst/>
+    <dgm:txLinClrLst/>
+    <dgm:txFillClrLst/>
+    <dgm:txEffectClrLst/>
+  </dgm:styleLbl>
+  <dgm:styleLbl name="asst2">
+    <dgm:fillClrLst meth="repeat">
+      <a:schemeClr val="accent1"/>
+    </dgm:fillClrLst>
+    <dgm:linClrLst meth="repeat">
+      <a:schemeClr val="lt1"/>
+    </dgm:linClrLst>
+    <dgm:effectClrLst/>
+    <dgm:txLinClrLst/>
+    <dgm:txFillClrLst/>
+    <dgm:txEffectClrLst/>
+  </dgm:styleLbl>
+  <dgm:styleLbl name="asst3">
+    <dgm:fillClrLst meth="repeat">
+      <a:schemeClr val="accent1"/>
+    </dgm:fillClrLst>
+    <dgm:linClrLst meth="repeat">
+      <a:schemeClr val="lt1"/>
+    </dgm:linClrLst>
+    <dgm:effectClrLst/>
+    <dgm:txLinClrLst/>
+    <dgm:txFillClrLst/>
+    <dgm:txEffectClrLst/>
+  </dgm:styleLbl>
+  <dgm:styleLbl name="asst4">
+    <dgm:fillClrLst meth="repeat">
+      <a:schemeClr val="accent1"/>
+    </dgm:fillClrLst>
+    <dgm:linClrLst meth="repeat">
+      <a:schemeClr val="lt1"/>
+    </dgm:linClrLst>
+    <dgm:effectClrLst/>
+    <dgm:txLinClrLst/>
+    <dgm:txFillClrLst/>
+    <dgm:txEffectClrLst/>
+  </dgm:styleLbl>
+  <dgm:styleLbl name="parChTrans2D1">
+    <dgm:fillClrLst meth="repeat">
+      <a:schemeClr val="accent1">
+        <a:tint val="60000"/>
+      </a:schemeClr>
+    </dgm:fillClrLst>
+    <dgm:linClrLst meth="repeat">
+      <a:schemeClr val="accent1">
+        <a:tint val="60000"/>
+      </a:schemeClr>
+    </dgm:linClrLst>
+    <dgm:effectClrLst/>
+    <dgm:txLinClrLst/>
+    <dgm:txFillClrLst meth="repeat">
+      <a:schemeClr val="lt1"/>
+    </dgm:txFillClrLst>
+    <dgm:txEffectClrLst/>
+  </dgm:styleLbl>
+  <dgm:styleLbl name="parChTrans2D2">
+    <dgm:fillClrLst meth="repeat">
+      <a:schemeClr val="accent1"/>
+    </dgm:fillClrLst>
+    <dgm:linClrLst meth="repeat">
+      <a:schemeClr val="accent1"/>
+    </dgm:linClrLst>
+    <dgm:effectClrLst/>
+    <dgm:txLinClrLst/>
+    <dgm:txFillClrLst meth="repeat">
+      <a:schemeClr val="lt1"/>
+    </dgm:txFillClrLst>
+    <dgm:txEffectClrLst/>
+  </dgm:styleLbl>
+  <dgm:styleLbl name="parChTrans2D3">
+    <dgm:fillClrLst meth="repeat">
+      <a:schemeClr val="accent1"/>
+    </dgm:fillClrLst>
+    <dgm:linClrLst meth="repeat">
+      <a:schemeClr val="accent1"/>
+    </dgm:linClrLst>
+    <dgm:effectClrLst/>
+    <dgm:txLinClrLst/>
+    <dgm:txFillClrLst meth="repeat">
+      <a:schemeClr val="lt1"/>
+    </dgm:txFillClrLst>
+    <dgm:txEffectClrLst/>
+  </dgm:styleLbl>
+  <dgm:styleLbl name="parChTrans2D4">
+    <dgm:fillClrLst meth="repeat">
+      <a:schemeClr val="accent1"/>
+    </dgm:fillClrLst>
+    <dgm:linClrLst meth="repeat">
+      <a:schemeClr val="accent1"/>
+    </dgm:linClrLst>
+    <dgm:effectClrLst/>
+    <dgm:txLinClrLst/>
+    <dgm:txFillClrLst meth="repeat">
+      <a:schemeClr val="lt1"/>
+    </dgm:txFillClrLst>
+    <dgm:txEffectClrLst/>
+  </dgm:styleLbl>
+  <dgm:styleLbl name="parChTrans1D1">
+    <dgm:fillClrLst meth="repeat">
+      <a:schemeClr val="accent1"/>
+    </dgm:fillClrLst>
+    <dgm:linClrLst meth="repeat">
+      <a:schemeClr val="accent1">
+        <a:shade val="60000"/>
+      </a:schemeClr>
+    </dgm:linClrLst>
+    <dgm:effectClrLst/>
+    <dgm:txLinClrLst/>
+    <dgm:txFillClrLst meth="repeat">
+      <a:schemeClr val="tx1"/>
+    </dgm:txFillClrLst>
+    <dgm:txEffectClrLst/>
+  </dgm:styleLbl>
+  <dgm:styleLbl name="parChTrans1D2">
+    <dgm:fillClrLst meth="repeat">
+      <a:schemeClr val="accent1"/>
+    </dgm:fillClrLst>
+    <dgm:linClrLst meth="repeat">
+      <a:schemeClr val="accent1">
+        <a:shade val="60000"/>
+      </a:schemeClr>
+    </dgm:linClrLst>
+    <dgm:effectClrLst/>
+    <dgm:txLinClrLst/>
+    <dgm:txFillClrLst meth="repeat">
+      <a:schemeClr val="tx1"/>
+    </dgm:txFillClrLst>
+    <dgm:txEffectClrLst/>
+  </dgm:styleLbl>
+  <dgm:styleLbl name="parChTrans1D3">
+    <dgm:fillClrLst meth="repeat">
+      <a:schemeClr val="accent1"/>
+    </dgm:fillClrLst>
+    <dgm:linClrLst meth="repeat">
+      <a:schemeClr val="accent1">
+        <a:shade val="80000"/>
+      </a:schemeClr>
+    </dgm:linClrLst>
+    <dgm:effectClrLst/>
+    <dgm:txLinClrLst/>
+    <dgm:txFillClrLst meth="repeat">
+      <a:schemeClr val="tx1"/>
+    </dgm:txFillClrLst>
+    <dgm:txEffectClrLst/>
+  </dgm:styleLbl>
+  <dgm:styleLbl name="parChTrans1D4">
+    <dgm:fillClrLst meth="repeat">
+      <a:schemeClr val="accent1"/>
+    </dgm:fillClrLst>
+    <dgm:linClrLst meth="repeat">
+      <a:schemeClr val="accent1">
+        <a:shade val="80000"/>
+      </a:schemeClr>
+    </dgm:linClrLst>
+    <dgm:effectClrLst/>
+    <dgm:txLinClrLst/>
+    <dgm:txFillClrLst meth="repeat">
+      <a:schemeClr val="tx1"/>
+    </dgm:txFillClrLst>
+    <dgm:txEffectClrLst/>
+  </dgm:styleLbl>
+  <dgm:styleLbl name="fgAcc1">
+    <dgm:fillClrLst meth="repeat">
+      <a:schemeClr val="lt1">
+        <a:alpha val="90000"/>
+      </a:schemeClr>
+    </dgm:fillClrLst>
+    <dgm:linClrLst meth="repeat">
+      <a:schemeClr val="accent1"/>
+    </dgm:linClrLst>
+    <dgm:effectClrLst/>
+    <dgm:txLinClrLst/>
+    <dgm:txFillClrLst meth="repeat">
+      <a:schemeClr val="dk1"/>
+    </dgm:txFillClrLst>
+    <dgm:txEffectClrLst/>
+  </dgm:styleLbl>
+  <dgm:styleLbl name="conFgAcc1">
+    <dgm:fillClrLst meth="repeat">
+      <a:schemeClr val="lt1">
+        <a:alpha val="90000"/>
+      </a:schemeClr>
+    </dgm:fillClrLst>
+    <dgm:linClrLst meth="repeat">
+      <a:schemeClr val="accent1"/>
+    </dgm:linClrLst>
+    <dgm:effectClrLst/>
+    <dgm:txLinClrLst/>
+    <dgm:txFillClrLst meth="repeat">
+      <a:schemeClr val="dk1"/>
+    </dgm:txFillClrLst>
+    <dgm:txEffectClrLst/>
+  </dgm:styleLbl>
+  <dgm:styleLbl name="alignAcc1">
+    <dgm:fillClrLst meth="repeat">
+      <a:schemeClr val="lt1">
+        <a:alpha val="90000"/>
+      </a:schemeClr>
+    </dgm:fillClrLst>
+    <dgm:linClrLst meth="repeat">
+      <a:schemeClr val="accent1"/>
+    </dgm:linClrLst>
+    <dgm:effectClrLst/>
+    <dgm:txLinClrLst/>
+    <dgm:txFillClrLst meth="repeat">
+      <a:schemeClr val="dk1"/>
+    </dgm:txFillClrLst>
+    <dgm:txEffectClrLst/>
+  </dgm:styleLbl>
+  <dgm:styleLbl name="trAlignAcc1">
+    <dgm:fillClrLst meth="repeat">
+      <a:schemeClr val="lt1">
+        <a:alpha val="40000"/>
+      </a:schemeClr>
+    </dgm:fillClrLst>
+    <dgm:linClrLst meth="repeat">
+      <a:schemeClr val="accent1"/>
+    </dgm:linClrLst>
+    <dgm:effectClrLst/>
+    <dgm:txLinClrLst/>
+    <dgm:txFillClrLst meth="repeat">
+      <a:schemeClr val="dk1"/>
+    </dgm:txFillClrLst>
+    <dgm:txEffectClrLst/>
+  </dgm:styleLbl>
+  <dgm:styleLbl name="bgAcc1">
+    <dgm:fillClrLst meth="repeat">
+      <a:schemeClr val="lt1">
+        <a:alpha val="90000"/>
+      </a:schemeClr>
+    </dgm:fillClrLst>
+    <dgm:linClrLst meth="repeat">
+      <a:schemeClr val="accent1"/>
+    </dgm:linClrLst>
+    <dgm:effectClrLst/>
+    <dgm:txLinClrLst/>
+    <dgm:txFillClrLst meth="repeat">
+      <a:schemeClr val="dk1"/>
+    </dgm:txFillClrLst>
+    <dgm:txEffectClrLst/>
+  </dgm:styleLbl>
+  <dgm:styleLbl name="solidFgAcc1">
+    <dgm:fillClrLst meth="repeat">
+      <a:schemeClr val="lt1"/>
+    </dgm:fillClrLst>
+    <dgm:linClrLst meth="repeat">
+      <a:schemeClr val="accent1"/>
+    </dgm:linClrLst>
+    <dgm:effectClrLst/>
+    <dgm:txLinClrLst/>
+    <dgm:txFillClrLst meth="repeat">
+      <a:schemeClr val="dk1"/>
+    </dgm:txFillClrLst>
+    <dgm:txEffectClrLst/>
+  </dgm:styleLbl>
+  <dgm:styleLbl name="solidAlignAcc1">
+    <dgm:fillClrLst meth="repeat">
+      <a:schemeClr val="lt1"/>
+    </dgm:fillClrLst>
+    <dgm:linClrLst meth="repeat">
+      <a:schemeClr val="accent1"/>
+    </dgm:linClrLst>
+    <dgm:effectClrLst/>
+    <dgm:txLinClrLst/>
+    <dgm:txFillClrLst meth="repeat">
+      <a:schemeClr val="dk1"/>
+    </dgm:txFillClrLst>
+    <dgm:txEffectClrLst/>
+  </dgm:styleLbl>
+  <dgm:styleLbl name="solidBgAcc1">
+    <dgm:fillClrLst meth="repeat">
+      <a:schemeClr val="lt1"/>
+    </dgm:fillClrLst>
+    <dgm:linClrLst meth="repeat">
+      <a:schemeClr val="accent1"/>
+    </dgm:linClrLst>
+    <dgm:effectClrLst/>
+    <dgm:txLinClrLst/>
+    <dgm:txFillClrLst meth="repeat">
+      <a:schemeClr val="dk1"/>
+    </dgm:txFillClrLst>
+    <dgm:txEffectClrLst/>
+  </dgm:styleLbl>
+  <dgm:styleLbl name="fgAccFollowNode1">
+    <dgm:fillClrLst meth="repeat">
+      <a:schemeClr val="accent1">
+        <a:alpha val="90000"/>
+        <a:tint val="40000"/>
+      </a:schemeClr>
+    </dgm:fillClrLst>
+    <dgm:linClrLst meth="repeat">
+      <a:schemeClr val="accent1">
+        <a:alpha val="90000"/>
+        <a:tint val="40000"/>
+      </a:schemeClr>
+    </dgm:linClrLst>
+    <dgm:effectClrLst/>
+    <dgm:txLinClrLst/>
+    <dgm:txFillClrLst meth="repeat">
+      <a:schemeClr val="dk1"/>
+    </dgm:txFillClrLst>
+    <dgm:txEffectClrLst/>
+  </dgm:styleLbl>
+  <dgm:styleLbl name="alignAccFollowNode1">
+    <dgm:fillClrLst meth="repeat">
+      <a:schemeClr val="accent1">
+        <a:alpha val="90000"/>
+        <a:tint val="40000"/>
+      </a:schemeClr>
+    </dgm:fillClrLst>
+    <dgm:linClrLst meth="repeat">
+      <a:schemeClr val="accent1">
+        <a:alpha val="90000"/>
+        <a:tint val="40000"/>
+      </a:schemeClr>
+    </dgm:linClrLst>
+    <dgm:effectClrLst/>
+    <dgm:txLinClrLst/>
+    <dgm:txFillClrLst meth="repeat">
+      <a:schemeClr val="dk1"/>
+    </dgm:txFillClrLst>
+    <dgm:txEffectClrLst/>
+  </dgm:styleLbl>
+  <dgm:styleLbl name="bgAccFollowNode1">
+    <dgm:fillClrLst meth="repeat">
+      <a:schemeClr val="accent1">
+        <a:alpha val="90000"/>
+        <a:tint val="40000"/>
+      </a:schemeClr>
+    </dgm:fillClrLst>
+    <dgm:linClrLst meth="repeat">
+      <a:schemeClr val="accent1">
+        <a:alpha val="90000"/>
+        <a:tint val="40000"/>
+      </a:schemeClr>
+    </dgm:linClrLst>
+    <dgm:effectClrLst/>
+    <dgm:txLinClrLst/>
+    <dgm:txFillClrLst meth="repeat">
+      <a:schemeClr val="dk1"/>
+    </dgm:txFillClrLst>
+    <dgm:txEffectClrLst/>
+  </dgm:styleLbl>
+  <dgm:styleLbl name="fgAcc0">
+    <dgm:fillClrLst meth="repeat">
+      <a:schemeClr val="lt1">
+        <a:alpha val="90000"/>
+      </a:schemeClr>
+    </dgm:fillClrLst>
+    <dgm:linClrLst meth="repeat">
+      <a:schemeClr val="accent1"/>
+    </dgm:linClrLst>
+    <dgm:effectClrLst/>
+    <dgm:txLinClrLst/>
+    <dgm:txFillClrLst meth="repeat">
+      <a:schemeClr val="dk1"/>
+    </dgm:txFillClrLst>
+    <dgm:txEffectClrLst/>
+  </dgm:styleLbl>
+  <dgm:styleLbl name="fgAcc2">
+    <dgm:fillClrLst meth="repeat">
+      <a:schemeClr val="lt1">
+        <a:alpha val="90000"/>
+      </a:schemeClr>
+    </dgm:fillClrLst>
+    <dgm:linClrLst meth="repeat">
+      <a:schemeClr val="accent1"/>
+    </dgm:linClrLst>
+    <dgm:effectClrLst/>
+    <dgm:txLinClrLst/>
+    <dgm:txFillClrLst meth="repeat">
+      <a:schemeClr val="dk1"/>
+    </dgm:txFillClrLst>
+    <dgm:txEffectClrLst/>
+  </dgm:styleLbl>
+  <dgm:styleLbl name="fgAcc3">
+    <dgm:fillClrLst meth="repeat">
+      <a:schemeClr val="lt1">
+        <a:alpha val="90000"/>
+      </a:schemeClr>
+    </dgm:fillClrLst>
+    <dgm:linClrLst meth="repeat">
+      <a:schemeClr val="accent1"/>
+    </dgm:linClrLst>
+    <dgm:effectClrLst/>
+    <dgm:txLinClrLst/>
+    <dgm:txFillClrLst meth="repeat">
+      <a:schemeClr val="dk1"/>
+    </dgm:txFillClrLst>
+    <dgm:txEffectClrLst/>
+  </dgm:styleLbl>
+  <dgm:styleLbl name="fgAcc4">
+    <dgm:fillClrLst meth="repeat">
+      <a:schemeClr val="lt1">
+        <a:alpha val="90000"/>
+      </a:schemeClr>
+    </dgm:fillClrLst>
+    <dgm:linClrLst meth="repeat">
+      <a:schemeClr val="accent1"/>
+    </dgm:linClrLst>
+    <dgm:effectClrLst/>
+    <dgm:txLinClrLst/>
+    <dgm:txFillClrLst meth="repeat">
+      <a:schemeClr val="dk1"/>
+    </dgm:txFillClrLst>
+    <dgm:txEffectClrLst/>
+  </dgm:styleLbl>
+  <dgm:styleLbl name="bgShp">
+    <dgm:fillClrLst meth="repeat">
+      <a:schemeClr val="accent1">
+        <a:tint val="40000"/>
+      </a:schemeClr>
+    </dgm:fillClrLst>
+    <dgm:linClrLst meth="repeat">
+      <a:schemeClr val="accent1"/>
+    </dgm:linClrLst>
+    <dgm:effectClrLst/>
+    <dgm:txLinClrLst/>
+    <dgm:txFillClrLst meth="repeat">
+      <a:schemeClr val="dk1"/>
+    </dgm:txFillClrLst>
+    <dgm:txEffectClrLst/>
+  </dgm:styleLbl>
+  <dgm:styleLbl name="dkBgShp">
+    <dgm:fillClrLst meth="repeat">
+      <a:schemeClr val="accent1">
+        <a:shade val="80000"/>
+      </a:schemeClr>
+    </dgm:fillClrLst>
+    <dgm:linClrLst meth="repeat">
+      <a:schemeClr val="accent1"/>
+    </dgm:linClrLst>
+    <dgm:effectClrLst/>
+    <dgm:txLinClrLst/>
+    <dgm:txFillClrLst meth="repeat">
+      <a:schemeClr val="lt1"/>
+    </dgm:txFillClrLst>
+    <dgm:txEffectClrLst/>
+  </dgm:styleLbl>
+  <dgm:styleLbl name="trBgShp">
+    <dgm:fillClrLst meth="repeat">
+      <a:schemeClr val="accent1">
+        <a:tint val="50000"/>
+        <a:alpha val="40000"/>
+      </a:schemeClr>
+    </dgm:fillClrLst>
+    <dgm:linClrLst meth="repeat">
+      <a:schemeClr val="accent1"/>
+    </dgm:linClrLst>
+    <dgm:effectClrLst/>
+    <dgm:txLinClrLst/>
+    <dgm:txFillClrLst meth="repeat">
+      <a:schemeClr val="lt1"/>
+    </dgm:txFillClrLst>
+    <dgm:txEffectClrLst/>
+  </dgm:styleLbl>
+  <dgm:styleLbl name="fgShp">
+    <dgm:fillClrLst meth="repeat">
+      <a:schemeClr val="accent1">
+        <a:tint val="60000"/>
+      </a:schemeClr>
+    </dgm:fillClrLst>
+    <dgm:linClrLst meth="repeat">
+      <a:schemeClr val="lt1"/>
+    </dgm:linClrLst>
+    <dgm:effectClrLst/>
+    <dgm:txLinClrLst/>
+    <dgm:txFillClrLst meth="repeat">
+      <a:schemeClr val="dk1"/>
+    </dgm:txFillClrLst>
+    <dgm:txEffectClrLst/>
+  </dgm:styleLbl>
+  <dgm:styleLbl name="revTx">
+    <dgm:fillClrLst meth="repeat">
+      <a:schemeClr val="lt1">
+        <a:alpha val="0"/>
+      </a:schemeClr>
+    </dgm:fillClrLst>
+    <dgm:linClrLst meth="repeat">
+      <a:schemeClr val="dk1">
+        <a:alpha val="0"/>
+      </a:schemeClr>
+    </dgm:linClrLst>
+    <dgm:effectClrLst/>
+    <dgm:txLinClrLst/>
+    <dgm:txFillClrLst meth="repeat">
+      <a:schemeClr val="tx1"/>
+    </dgm:txFillClrLst>
+    <dgm:txEffectClrLst/>
+  </dgm:styleLbl>
+</dgm:colorsDef>
+</file>
+
+<file path=ppt/diagrams/data1.xml><?xml version="1.0" encoding="utf-8"?>
+<dgm:dataModel xmlns:dgm="http://schemas.openxmlformats.org/drawingml/2006/diagram" xmlns:a="http://schemas.openxmlformats.org/drawingml/2006/main">
+  <dgm:ptLst>
+    <dgm:pt modelId="{CBE4C905-CA5C-429C-B392-1E35A1BA7180}" type="doc">
+      <dgm:prSet loTypeId="urn:microsoft.com/office/officeart/2005/8/layout/hierarchy1" loCatId="hierarchy" qsTypeId="urn:microsoft.com/office/officeart/2005/8/quickstyle/simple1" qsCatId="simple" csTypeId="urn:microsoft.com/office/officeart/2005/8/colors/accent1_2" csCatId="accent1" phldr="1"/>
+      <dgm:spPr/>
+      <dgm:t>
+        <a:bodyPr/>
+        <a:lstStyle/>
+        <a:p>
+          <a:endParaRPr lang="en-US"/>
+        </a:p>
+      </dgm:t>
+    </dgm:pt>
+    <dgm:pt modelId="{0F3E1C79-808B-44E4-93EF-ECB6A9FBF6FF}">
+      <dgm:prSet/>
+      <dgm:spPr/>
+      <dgm:t>
+        <a:bodyPr/>
+        <a:lstStyle/>
+        <a:p>
+          <a:r>
+            <a:rPr lang="en-US"/>
+            <a:t>55 Samples did not give us very much to work with. Our best accuracy was around 60%</a:t>
+          </a:r>
+        </a:p>
+      </dgm:t>
+    </dgm:pt>
+    <dgm:pt modelId="{0F25E223-78DA-423B-B14B-F242D89FF7E3}" type="parTrans" cxnId="{5F0A6356-D7D7-4620-9E2D-567FD0C63F95}">
+      <dgm:prSet/>
+      <dgm:spPr/>
+      <dgm:t>
+        <a:bodyPr/>
+        <a:lstStyle/>
+        <a:p>
+          <a:endParaRPr lang="en-US"/>
+        </a:p>
+      </dgm:t>
+    </dgm:pt>
+    <dgm:pt modelId="{92BBAD9F-5F28-4CA6-8198-640943C664FD}" type="sibTrans" cxnId="{5F0A6356-D7D7-4620-9E2D-567FD0C63F95}">
+      <dgm:prSet/>
+      <dgm:spPr/>
+      <dgm:t>
+        <a:bodyPr/>
+        <a:lstStyle/>
+        <a:p>
+          <a:endParaRPr lang="en-US"/>
+        </a:p>
+      </dgm:t>
+    </dgm:pt>
+    <dgm:pt modelId="{FC0BC24A-A249-437E-823E-126898CDAC63}">
+      <dgm:prSet/>
+      <dgm:spPr/>
+      <dgm:t>
+        <a:bodyPr/>
+        <a:lstStyle/>
+        <a:p>
+          <a:r>
+            <a:rPr lang="en-US" dirty="0"/>
+            <a:t>To solve this, we ended up splitting each person into their days that they participated in the experiment with dramatically increased our sample size. </a:t>
+          </a:r>
+        </a:p>
+      </dgm:t>
+    </dgm:pt>
+    <dgm:pt modelId="{D6942AC1-C26B-4FDD-991C-181EBF3E6FBC}" type="parTrans" cxnId="{6A16200E-3655-40DB-8D9B-01887009E2EA}">
+      <dgm:prSet/>
+      <dgm:spPr/>
+      <dgm:t>
+        <a:bodyPr/>
+        <a:lstStyle/>
+        <a:p>
+          <a:endParaRPr lang="en-US"/>
+        </a:p>
+      </dgm:t>
+    </dgm:pt>
+    <dgm:pt modelId="{3FF7958A-DF5E-4AD0-B90B-6D89F2214169}" type="sibTrans" cxnId="{6A16200E-3655-40DB-8D9B-01887009E2EA}">
+      <dgm:prSet/>
+      <dgm:spPr/>
+      <dgm:t>
+        <a:bodyPr/>
+        <a:lstStyle/>
+        <a:p>
+          <a:endParaRPr lang="en-US"/>
+        </a:p>
+      </dgm:t>
+    </dgm:pt>
+    <dgm:pt modelId="{1017DA6D-A945-4A32-A49E-FA0A4B1F29D6}" type="pres">
+      <dgm:prSet presAssocID="{CBE4C905-CA5C-429C-B392-1E35A1BA7180}" presName="hierChild1" presStyleCnt="0">
+        <dgm:presLayoutVars>
+          <dgm:chPref val="1"/>
+          <dgm:dir/>
+          <dgm:animOne val="branch"/>
+          <dgm:animLvl val="lvl"/>
+          <dgm:resizeHandles/>
+        </dgm:presLayoutVars>
+      </dgm:prSet>
+      <dgm:spPr/>
+    </dgm:pt>
+    <dgm:pt modelId="{8037E1C6-50DD-46BE-B09F-FF1F2347B3DD}" type="pres">
+      <dgm:prSet presAssocID="{0F3E1C79-808B-44E4-93EF-ECB6A9FBF6FF}" presName="hierRoot1" presStyleCnt="0"/>
+      <dgm:spPr/>
+    </dgm:pt>
+    <dgm:pt modelId="{8EFAA67C-AD5D-4B49-BA8C-D2015C9DD324}" type="pres">
+      <dgm:prSet presAssocID="{0F3E1C79-808B-44E4-93EF-ECB6A9FBF6FF}" presName="composite" presStyleCnt="0"/>
+      <dgm:spPr/>
+    </dgm:pt>
+    <dgm:pt modelId="{1486FD6A-A0DE-4FA9-AD99-AFBC2397F8A2}" type="pres">
+      <dgm:prSet presAssocID="{0F3E1C79-808B-44E4-93EF-ECB6A9FBF6FF}" presName="background" presStyleLbl="node0" presStyleIdx="0" presStyleCnt="2"/>
+      <dgm:spPr/>
+    </dgm:pt>
+    <dgm:pt modelId="{EE849D6E-EC5E-4243-AFD6-7502B065C6AE}" type="pres">
+      <dgm:prSet presAssocID="{0F3E1C79-808B-44E4-93EF-ECB6A9FBF6FF}" presName="text" presStyleLbl="fgAcc0" presStyleIdx="0" presStyleCnt="2">
+        <dgm:presLayoutVars>
+          <dgm:chPref val="3"/>
+        </dgm:presLayoutVars>
+      </dgm:prSet>
+      <dgm:spPr/>
+    </dgm:pt>
+    <dgm:pt modelId="{C312A36D-6260-44A9-A8B2-2E86203E8C11}" type="pres">
+      <dgm:prSet presAssocID="{0F3E1C79-808B-44E4-93EF-ECB6A9FBF6FF}" presName="hierChild2" presStyleCnt="0"/>
+      <dgm:spPr/>
+    </dgm:pt>
+    <dgm:pt modelId="{2876D716-EF12-44EA-90FB-CC99133A538D}" type="pres">
+      <dgm:prSet presAssocID="{FC0BC24A-A249-437E-823E-126898CDAC63}" presName="hierRoot1" presStyleCnt="0"/>
+      <dgm:spPr/>
+    </dgm:pt>
+    <dgm:pt modelId="{C7AF1956-2071-4EBE-AABA-D110AE5DBE4F}" type="pres">
+      <dgm:prSet presAssocID="{FC0BC24A-A249-437E-823E-126898CDAC63}" presName="composite" presStyleCnt="0"/>
+      <dgm:spPr/>
+    </dgm:pt>
+    <dgm:pt modelId="{FAF32E9D-8235-43E4-865C-247BB9E2EB90}" type="pres">
+      <dgm:prSet presAssocID="{FC0BC24A-A249-437E-823E-126898CDAC63}" presName="background" presStyleLbl="node0" presStyleIdx="1" presStyleCnt="2"/>
+      <dgm:spPr/>
+    </dgm:pt>
+    <dgm:pt modelId="{A88335FF-0335-4B02-A39C-BD3378723EEC}" type="pres">
+      <dgm:prSet presAssocID="{FC0BC24A-A249-437E-823E-126898CDAC63}" presName="text" presStyleLbl="fgAcc0" presStyleIdx="1" presStyleCnt="2">
+        <dgm:presLayoutVars>
+          <dgm:chPref val="3"/>
+        </dgm:presLayoutVars>
+      </dgm:prSet>
+      <dgm:spPr/>
+    </dgm:pt>
+    <dgm:pt modelId="{4BC8139B-61EF-406C-974A-FFEF4CE06AD1}" type="pres">
+      <dgm:prSet presAssocID="{FC0BC24A-A249-437E-823E-126898CDAC63}" presName="hierChild2" presStyleCnt="0"/>
+      <dgm:spPr/>
+    </dgm:pt>
+  </dgm:ptLst>
+  <dgm:cxnLst>
+    <dgm:cxn modelId="{6A16200E-3655-40DB-8D9B-01887009E2EA}" srcId="{CBE4C905-CA5C-429C-B392-1E35A1BA7180}" destId="{FC0BC24A-A249-437E-823E-126898CDAC63}" srcOrd="1" destOrd="0" parTransId="{D6942AC1-C26B-4FDD-991C-181EBF3E6FBC}" sibTransId="{3FF7958A-DF5E-4AD0-B90B-6D89F2214169}"/>
+    <dgm:cxn modelId="{C1B2F028-817E-462F-9028-6C4A748ABAD2}" type="presOf" srcId="{CBE4C905-CA5C-429C-B392-1E35A1BA7180}" destId="{1017DA6D-A945-4A32-A49E-FA0A4B1F29D6}" srcOrd="0" destOrd="0" presId="urn:microsoft.com/office/officeart/2005/8/layout/hierarchy1"/>
+    <dgm:cxn modelId="{8C8C6F38-C99B-4958-B96B-B851C6237930}" type="presOf" srcId="{0F3E1C79-808B-44E4-93EF-ECB6A9FBF6FF}" destId="{EE849D6E-EC5E-4243-AFD6-7502B065C6AE}" srcOrd="0" destOrd="0" presId="urn:microsoft.com/office/officeart/2005/8/layout/hierarchy1"/>
+    <dgm:cxn modelId="{5F0A6356-D7D7-4620-9E2D-567FD0C63F95}" srcId="{CBE4C905-CA5C-429C-B392-1E35A1BA7180}" destId="{0F3E1C79-808B-44E4-93EF-ECB6A9FBF6FF}" srcOrd="0" destOrd="0" parTransId="{0F25E223-78DA-423B-B14B-F242D89FF7E3}" sibTransId="{92BBAD9F-5F28-4CA6-8198-640943C664FD}"/>
+    <dgm:cxn modelId="{F1069988-6AB5-4493-AFA8-A48C56535C5E}" type="presOf" srcId="{FC0BC24A-A249-437E-823E-126898CDAC63}" destId="{A88335FF-0335-4B02-A39C-BD3378723EEC}" srcOrd="0" destOrd="0" presId="urn:microsoft.com/office/officeart/2005/8/layout/hierarchy1"/>
+    <dgm:cxn modelId="{92F34935-F6FA-4F00-A215-5237A820A0AB}" type="presParOf" srcId="{1017DA6D-A945-4A32-A49E-FA0A4B1F29D6}" destId="{8037E1C6-50DD-46BE-B09F-FF1F2347B3DD}" srcOrd="0" destOrd="0" presId="urn:microsoft.com/office/officeart/2005/8/layout/hierarchy1"/>
+    <dgm:cxn modelId="{AB397AB0-D8C4-47C2-8210-779385D491A9}" type="presParOf" srcId="{8037E1C6-50DD-46BE-B09F-FF1F2347B3DD}" destId="{8EFAA67C-AD5D-4B49-BA8C-D2015C9DD324}" srcOrd="0" destOrd="0" presId="urn:microsoft.com/office/officeart/2005/8/layout/hierarchy1"/>
+    <dgm:cxn modelId="{8A9FB0AE-2633-4B99-A125-5A9127D4426E}" type="presParOf" srcId="{8EFAA67C-AD5D-4B49-BA8C-D2015C9DD324}" destId="{1486FD6A-A0DE-4FA9-AD99-AFBC2397F8A2}" srcOrd="0" destOrd="0" presId="urn:microsoft.com/office/officeart/2005/8/layout/hierarchy1"/>
+    <dgm:cxn modelId="{2702C07B-42EF-412B-9F13-0F0B38A02225}" type="presParOf" srcId="{8EFAA67C-AD5D-4B49-BA8C-D2015C9DD324}" destId="{EE849D6E-EC5E-4243-AFD6-7502B065C6AE}" srcOrd="1" destOrd="0" presId="urn:microsoft.com/office/officeart/2005/8/layout/hierarchy1"/>
+    <dgm:cxn modelId="{EAC942F8-A00D-4685-80FB-C2306692335F}" type="presParOf" srcId="{8037E1C6-50DD-46BE-B09F-FF1F2347B3DD}" destId="{C312A36D-6260-44A9-A8B2-2E86203E8C11}" srcOrd="1" destOrd="0" presId="urn:microsoft.com/office/officeart/2005/8/layout/hierarchy1"/>
+    <dgm:cxn modelId="{D89A2725-ABF0-4256-973D-3DAF5ED567C1}" type="presParOf" srcId="{1017DA6D-A945-4A32-A49E-FA0A4B1F29D6}" destId="{2876D716-EF12-44EA-90FB-CC99133A538D}" srcOrd="1" destOrd="0" presId="urn:microsoft.com/office/officeart/2005/8/layout/hierarchy1"/>
+    <dgm:cxn modelId="{20A09492-4ECF-462F-A565-331F0A87C83F}" type="presParOf" srcId="{2876D716-EF12-44EA-90FB-CC99133A538D}" destId="{C7AF1956-2071-4EBE-AABA-D110AE5DBE4F}" srcOrd="0" destOrd="0" presId="urn:microsoft.com/office/officeart/2005/8/layout/hierarchy1"/>
+    <dgm:cxn modelId="{14744E5D-C837-4F65-B31E-26833DB93464}" type="presParOf" srcId="{C7AF1956-2071-4EBE-AABA-D110AE5DBE4F}" destId="{FAF32E9D-8235-43E4-865C-247BB9E2EB90}" srcOrd="0" destOrd="0" presId="urn:microsoft.com/office/officeart/2005/8/layout/hierarchy1"/>
+    <dgm:cxn modelId="{6141DBA5-45CF-4A92-B831-5EF87D5E040E}" type="presParOf" srcId="{C7AF1956-2071-4EBE-AABA-D110AE5DBE4F}" destId="{A88335FF-0335-4B02-A39C-BD3378723EEC}" srcOrd="1" destOrd="0" presId="urn:microsoft.com/office/officeart/2005/8/layout/hierarchy1"/>
+    <dgm:cxn modelId="{6765653A-398E-42E0-B3C8-1FD8F58E07C1}" type="presParOf" srcId="{2876D716-EF12-44EA-90FB-CC99133A538D}" destId="{4BC8139B-61EF-406C-974A-FFEF4CE06AD1}" srcOrd="1" destOrd="0" presId="urn:microsoft.com/office/officeart/2005/8/layout/hierarchy1"/>
+  </dgm:cxnLst>
+  <dgm:bg/>
+  <dgm:whole/>
+  <dgm:extLst>
+    <a:ext uri="http://schemas.microsoft.com/office/drawing/2008/diagram">
+      <dsp:dataModelExt xmlns:dsp="http://schemas.microsoft.com/office/drawing/2008/diagram" relId="rId7" minVer="http://schemas.openxmlformats.org/drawingml/2006/diagram"/>
+    </a:ext>
+  </dgm:extLst>
+</dgm:dataModel>
+</file>
+
+<file path=ppt/diagrams/drawing1.xml><?xml version="1.0" encoding="utf-8"?>
+<dsp:drawing xmlns:dgm="http://schemas.openxmlformats.org/drawingml/2006/diagram" xmlns:dsp="http://schemas.microsoft.com/office/drawing/2008/diagram" xmlns:a="http://schemas.openxmlformats.org/drawingml/2006/main">
+  <dsp:spTree>
+    <dsp:nvGrpSpPr>
+      <dsp:cNvPr id="0" name=""/>
+      <dsp:cNvGrpSpPr/>
+    </dsp:nvGrpSpPr>
+    <dsp:grpSpPr/>
+    <dsp:sp modelId="{1486FD6A-A0DE-4FA9-AD99-AFBC2397F8A2}">
+      <dsp:nvSpPr>
+        <dsp:cNvPr id="0" name=""/>
+        <dsp:cNvSpPr/>
+      </dsp:nvSpPr>
+      <dsp:spPr>
+        <a:xfrm>
+          <a:off x="80956" y="117"/>
+          <a:ext cx="4683583" cy="2974075"/>
+        </a:xfrm>
+        <a:prstGeom prst="roundRect">
+          <a:avLst>
+            <a:gd name="adj" fmla="val 10000"/>
+          </a:avLst>
+        </a:prstGeom>
+        <a:solidFill>
+          <a:schemeClr val="accent1">
+            <a:hueOff val="0"/>
+            <a:satOff val="0"/>
+            <a:lumOff val="0"/>
+            <a:alphaOff val="0"/>
+          </a:schemeClr>
+        </a:solidFill>
+        <a:ln w="12700" cap="flat" cmpd="sng" algn="ctr">
+          <a:solidFill>
+            <a:schemeClr val="lt1">
+              <a:hueOff val="0"/>
+              <a:satOff val="0"/>
+              <a:lumOff val="0"/>
+              <a:alphaOff val="0"/>
+            </a:schemeClr>
+          </a:solidFill>
+          <a:prstDash val="solid"/>
+          <a:miter lim="800000"/>
+        </a:ln>
+        <a:effectLst/>
+      </dsp:spPr>
+      <dsp:style>
+        <a:lnRef idx="2">
+          <a:scrgbClr r="0" g="0" b="0"/>
+        </a:lnRef>
+        <a:fillRef idx="1">
+          <a:scrgbClr r="0" g="0" b="0"/>
+        </a:fillRef>
+        <a:effectRef idx="0">
+          <a:scrgbClr r="0" g="0" b="0"/>
+        </a:effectRef>
+        <a:fontRef idx="minor">
+          <a:schemeClr val="lt1"/>
+        </a:fontRef>
+      </dsp:style>
+    </dsp:sp>
+    <dsp:sp modelId="{EE849D6E-EC5E-4243-AFD6-7502B065C6AE}">
+      <dsp:nvSpPr>
+        <dsp:cNvPr id="0" name=""/>
+        <dsp:cNvSpPr/>
+      </dsp:nvSpPr>
+      <dsp:spPr>
+        <a:xfrm>
+          <a:off x="601355" y="494496"/>
+          <a:ext cx="4683583" cy="2974075"/>
+        </a:xfrm>
+        <a:prstGeom prst="roundRect">
+          <a:avLst>
+            <a:gd name="adj" fmla="val 10000"/>
+          </a:avLst>
+        </a:prstGeom>
+        <a:solidFill>
+          <a:schemeClr val="lt1">
+            <a:alpha val="90000"/>
+            <a:hueOff val="0"/>
+            <a:satOff val="0"/>
+            <a:lumOff val="0"/>
+            <a:alphaOff val="0"/>
+          </a:schemeClr>
+        </a:solidFill>
+        <a:ln w="12700" cap="flat" cmpd="sng" algn="ctr">
+          <a:solidFill>
+            <a:schemeClr val="accent1">
+              <a:hueOff val="0"/>
+              <a:satOff val="0"/>
+              <a:lumOff val="0"/>
+              <a:alphaOff val="0"/>
+            </a:schemeClr>
+          </a:solidFill>
+          <a:prstDash val="solid"/>
+          <a:miter lim="800000"/>
+        </a:ln>
+        <a:effectLst/>
+      </dsp:spPr>
+      <dsp:style>
+        <a:lnRef idx="2">
+          <a:scrgbClr r="0" g="0" b="0"/>
+        </a:lnRef>
+        <a:fillRef idx="1">
+          <a:scrgbClr r="0" g="0" b="0"/>
+        </a:fillRef>
+        <a:effectRef idx="0">
+          <a:scrgbClr r="0" g="0" b="0"/>
+        </a:effectRef>
+        <a:fontRef idx="minor"/>
+      </dsp:style>
+      <dsp:txBody>
+        <a:bodyPr spcFirstLastPara="0" vert="horz" wrap="square" lIns="106680" tIns="106680" rIns="106680" bIns="106680" numCol="1" spcCol="1270" anchor="ctr" anchorCtr="0">
+          <a:noAutofit/>
+        </a:bodyPr>
+        <a:lstStyle/>
+        <a:p>
+          <a:pPr marL="0" lvl="0" indent="0" algn="ctr" defTabSz="1244600">
+            <a:lnSpc>
+              <a:spcPct val="90000"/>
+            </a:lnSpc>
+            <a:spcBef>
+              <a:spcPct val="0"/>
+            </a:spcBef>
+            <a:spcAft>
+              <a:spcPct val="35000"/>
+            </a:spcAft>
+            <a:buNone/>
+          </a:pPr>
+          <a:r>
+            <a:rPr lang="en-US" sz="2800" kern="1200"/>
+            <a:t>55 Samples did not give us very much to work with. Our best accuracy was around 60%</a:t>
+          </a:r>
+        </a:p>
+      </dsp:txBody>
+      <dsp:txXfrm>
+        <a:off x="688463" y="581604"/>
+        <a:ext cx="4509367" cy="2799859"/>
+      </dsp:txXfrm>
+    </dsp:sp>
+    <dsp:sp modelId="{FAF32E9D-8235-43E4-865C-247BB9E2EB90}">
+      <dsp:nvSpPr>
+        <dsp:cNvPr id="0" name=""/>
+        <dsp:cNvSpPr/>
+      </dsp:nvSpPr>
+      <dsp:spPr>
+        <a:xfrm>
+          <a:off x="5805337" y="117"/>
+          <a:ext cx="4683583" cy="2974075"/>
+        </a:xfrm>
+        <a:prstGeom prst="roundRect">
+          <a:avLst>
+            <a:gd name="adj" fmla="val 10000"/>
+          </a:avLst>
+        </a:prstGeom>
+        <a:solidFill>
+          <a:schemeClr val="accent1">
+            <a:hueOff val="0"/>
+            <a:satOff val="0"/>
+            <a:lumOff val="0"/>
+            <a:alphaOff val="0"/>
+          </a:schemeClr>
+        </a:solidFill>
+        <a:ln w="12700" cap="flat" cmpd="sng" algn="ctr">
+          <a:solidFill>
+            <a:schemeClr val="lt1">
+              <a:hueOff val="0"/>
+              <a:satOff val="0"/>
+              <a:lumOff val="0"/>
+              <a:alphaOff val="0"/>
+            </a:schemeClr>
+          </a:solidFill>
+          <a:prstDash val="solid"/>
+          <a:miter lim="800000"/>
+        </a:ln>
+        <a:effectLst/>
+      </dsp:spPr>
+      <dsp:style>
+        <a:lnRef idx="2">
+          <a:scrgbClr r="0" g="0" b="0"/>
+        </a:lnRef>
+        <a:fillRef idx="1">
+          <a:scrgbClr r="0" g="0" b="0"/>
+        </a:fillRef>
+        <a:effectRef idx="0">
+          <a:scrgbClr r="0" g="0" b="0"/>
+        </a:effectRef>
+        <a:fontRef idx="minor">
+          <a:schemeClr val="lt1"/>
+        </a:fontRef>
+      </dsp:style>
+    </dsp:sp>
+    <dsp:sp modelId="{A88335FF-0335-4B02-A39C-BD3378723EEC}">
+      <dsp:nvSpPr>
+        <dsp:cNvPr id="0" name=""/>
+        <dsp:cNvSpPr/>
+      </dsp:nvSpPr>
+      <dsp:spPr>
+        <a:xfrm>
+          <a:off x="6325735" y="494496"/>
+          <a:ext cx="4683583" cy="2974075"/>
+        </a:xfrm>
+        <a:prstGeom prst="roundRect">
+          <a:avLst>
+            <a:gd name="adj" fmla="val 10000"/>
+          </a:avLst>
+        </a:prstGeom>
+        <a:solidFill>
+          <a:schemeClr val="lt1">
+            <a:alpha val="90000"/>
+            <a:hueOff val="0"/>
+            <a:satOff val="0"/>
+            <a:lumOff val="0"/>
+            <a:alphaOff val="0"/>
+          </a:schemeClr>
+        </a:solidFill>
+        <a:ln w="12700" cap="flat" cmpd="sng" algn="ctr">
+          <a:solidFill>
+            <a:schemeClr val="accent1">
+              <a:hueOff val="0"/>
+              <a:satOff val="0"/>
+              <a:lumOff val="0"/>
+              <a:alphaOff val="0"/>
+            </a:schemeClr>
+          </a:solidFill>
+          <a:prstDash val="solid"/>
+          <a:miter lim="800000"/>
+        </a:ln>
+        <a:effectLst/>
+      </dsp:spPr>
+      <dsp:style>
+        <a:lnRef idx="2">
+          <a:scrgbClr r="0" g="0" b="0"/>
+        </a:lnRef>
+        <a:fillRef idx="1">
+          <a:scrgbClr r="0" g="0" b="0"/>
+        </a:fillRef>
+        <a:effectRef idx="0">
+          <a:scrgbClr r="0" g="0" b="0"/>
+        </a:effectRef>
+        <a:fontRef idx="minor"/>
+      </dsp:style>
+      <dsp:txBody>
+        <a:bodyPr spcFirstLastPara="0" vert="horz" wrap="square" lIns="106680" tIns="106680" rIns="106680" bIns="106680" numCol="1" spcCol="1270" anchor="ctr" anchorCtr="0">
+          <a:noAutofit/>
+        </a:bodyPr>
+        <a:lstStyle/>
+        <a:p>
+          <a:pPr marL="0" lvl="0" indent="0" algn="ctr" defTabSz="1244600">
+            <a:lnSpc>
+              <a:spcPct val="90000"/>
+            </a:lnSpc>
+            <a:spcBef>
+              <a:spcPct val="0"/>
+            </a:spcBef>
+            <a:spcAft>
+              <a:spcPct val="35000"/>
+            </a:spcAft>
+            <a:buNone/>
+          </a:pPr>
+          <a:r>
+            <a:rPr lang="en-US" sz="2800" kern="1200" dirty="0"/>
+            <a:t>To solve this, we ended up splitting each person into their days that they participated in the experiment with dramatically increased our sample size. </a:t>
+          </a:r>
+        </a:p>
+      </dsp:txBody>
+      <dsp:txXfrm>
+        <a:off x="6412843" y="581604"/>
+        <a:ext cx="4509367" cy="2799859"/>
+      </dsp:txXfrm>
+    </dsp:sp>
+  </dsp:spTree>
+</dsp:drawing>
+</file>
+
+<file path=ppt/diagrams/layout1.xml><?xml version="1.0" encoding="utf-8"?>
+<dgm:layoutDef xmlns:dgm="http://schemas.openxmlformats.org/drawingml/2006/diagram" xmlns:a="http://schemas.openxmlformats.org/drawingml/2006/main" uniqueId="urn:microsoft.com/office/officeart/2005/8/layout/hierarchy1">
+  <dgm:title val=""/>
+  <dgm:desc val=""/>
+  <dgm:catLst>
+    <dgm:cat type="hierarchy" pri="2000"/>
+  </dgm:catLst>
+  <dgm:sampData>
+    <dgm:dataModel>
+      <dgm:ptLst>
+        <dgm:pt modelId="0" type="doc"/>
+        <dgm:pt modelId="1">
+          <dgm:prSet phldr="1"/>
+        </dgm:pt>
+        <dgm:pt modelId="2">
+          <dgm:prSet phldr="1"/>
+        </dgm:pt>
+        <dgm:pt modelId="21">
+          <dgm:prSet phldr="1"/>
+        </dgm:pt>
+        <dgm:pt modelId="22">
+          <dgm:prSet phldr="1"/>
+        </dgm:pt>
+        <dgm:pt modelId="3">
+          <dgm:prSet phldr="1"/>
+        </dgm:pt>
+        <dgm:pt modelId="31">
+          <dgm:prSet phldr="1"/>
+        </dgm:pt>
+      </dgm:ptLst>
+      <dgm:cxnLst>
+        <dgm:cxn modelId="4" srcId="0" destId="1" srcOrd="0" destOrd="0"/>
+        <dgm:cxn modelId="5" srcId="1" destId="2" srcOrd="0" destOrd="0"/>
+        <dgm:cxn modelId="6" srcId="1" destId="3" srcOrd="1" destOrd="0"/>
+        <dgm:cxn modelId="23" srcId="2" destId="21" srcOrd="0" destOrd="0"/>
+        <dgm:cxn modelId="24" srcId="2" destId="22" srcOrd="1" destOrd="0"/>
+        <dgm:cxn modelId="33" srcId="3" destId="31" srcOrd="0" destOrd="0"/>
+      </dgm:cxnLst>
+      <dgm:bg/>
+      <dgm:whole/>
+    </dgm:dataModel>
+  </dgm:sampData>
+  <dgm:styleData>
+    <dgm:dataModel>
+      <dgm:ptLst>
+        <dgm:pt modelId="0" type="doc"/>
+        <dgm:pt modelId="1"/>
+        <dgm:pt modelId="11"/>
+        <dgm:pt modelId="12"/>
+      </dgm:ptLst>
+      <dgm:cxnLst>
+        <dgm:cxn modelId="2" srcId="0" destId="1" srcOrd="0" destOrd="0"/>
+        <dgm:cxn modelId="13" srcId="1" destId="11" srcOrd="0" destOrd="0"/>
+        <dgm:cxn modelId="14" srcId="1" destId="12" srcOrd="1" destOrd="0"/>
+      </dgm:cxnLst>
+      <dgm:bg/>
+      <dgm:whole/>
+    </dgm:dataModel>
+  </dgm:styleData>
+  <dgm:clrData>
+    <dgm:dataModel>
+      <dgm:ptLst>
+        <dgm:pt modelId="0" type="doc"/>
+        <dgm:pt modelId="1"/>
+        <dgm:pt modelId="2"/>
+        <dgm:pt modelId="21"/>
+        <dgm:pt modelId="211"/>
+        <dgm:pt modelId="3"/>
+        <dgm:pt modelId="31"/>
+        <dgm:pt modelId="311"/>
+      </dgm:ptLst>
+      <dgm:cxnLst>
+        <dgm:cxn modelId="4" srcId="0" destId="1" srcOrd="0" destOrd="0"/>
+        <dgm:cxn modelId="5" srcId="1" destId="2" srcOrd="0" destOrd="0"/>
+        <dgm:cxn modelId="6" srcId="1" destId="3" srcOrd="1" destOrd="0"/>
+        <dgm:cxn modelId="23" srcId="2" destId="21" srcOrd="0" destOrd="0"/>
+        <dgm:cxn modelId="24" srcId="21" destId="211" srcOrd="0" destOrd="0"/>
+        <dgm:cxn modelId="33" srcId="3" destId="31" srcOrd="0" destOrd="0"/>
+        <dgm:cxn modelId="34" srcId="31" destId="311" srcOrd="0" destOrd="0"/>
+      </dgm:cxnLst>
+      <dgm:bg/>
+      <dgm:whole/>
+    </dgm:dataModel>
+  </dgm:clrData>
+  <dgm:layoutNode name="hierChild1">
+    <dgm:varLst>
+      <dgm:chPref val="1"/>
+      <dgm:dir/>
+      <dgm:animOne val="branch"/>
+      <dgm:animLvl val="lvl"/>
+      <dgm:resizeHandles/>
+    </dgm:varLst>
+    <dgm:choose name="Name0">
+      <dgm:if name="Name1" func="var" arg="dir" op="equ" val="norm">
+        <dgm:alg type="hierChild">
+          <dgm:param type="linDir" val="fromL"/>
+        </dgm:alg>
+      </dgm:if>
+      <dgm:else name="Name2">
+        <dgm:alg type="hierChild">
+          <dgm:param type="linDir" val="fromR"/>
+        </dgm:alg>
+      </dgm:else>
+    </dgm:choose>
+    <dgm:shape xmlns:r="http://schemas.openxmlformats.org/officeDocument/2006/relationships" r:blip="">
+      <dgm:adjLst/>
+    </dgm:shape>
+    <dgm:presOf/>
+    <dgm:constrLst>
+      <dgm:constr type="primFontSz" for="des" ptType="node" op="equ" val="65"/>
+      <dgm:constr type="w" for="des" forName="composite" refType="w"/>
+      <dgm:constr type="h" for="des" forName="composite" refType="w" refFor="des" refForName="composite" fact="0.667"/>
+      <dgm:constr type="w" for="des" forName="composite2" refType="w" refFor="des" refForName="composite"/>
+      <dgm:constr type="h" for="des" forName="composite2" refType="h" refFor="des" refForName="composite"/>
+      <dgm:constr type="w" for="des" forName="composite3" refType="w" refFor="des" refForName="composite"/>
+      <dgm:constr type="h" for="des" forName="composite3" refType="h" refFor="des" refForName="composite"/>
+      <dgm:constr type="w" for="des" forName="composite4" refType="w" refFor="des" refForName="composite"/>
+      <dgm:constr type="h" for="des" forName="composite4" refType="h" refFor="des" refForName="composite"/>
+      <dgm:constr type="w" for="des" forName="composite5" refType="w" refFor="des" refForName="composite"/>
+      <dgm:constr type="h" for="des" forName="composite5" refType="h" refFor="des" refForName="composite"/>
+      <dgm:constr type="sibSp" refType="w" refFor="des" refForName="composite" fact="0.1"/>
+      <dgm:constr type="sibSp" for="des" forName="hierChild2" refType="sibSp"/>
+      <dgm:constr type="sibSp" for="des" forName="hierChild3" refType="sibSp"/>
+      <dgm:constr type="sibSp" for="des" forName="hierChild4" refType="sibSp"/>
+      <dgm:constr type="sibSp" for="des" forName="hierChild5" refType="sibSp"/>
+      <dgm:constr type="sibSp" for="des" forName="hierChild6" refType="sibSp"/>
+      <dgm:constr type="sp" for="des" forName="hierRoot1" refType="h" refFor="des" refForName="composite" fact="0.25"/>
+      <dgm:constr type="sp" for="des" forName="hierRoot2" refType="sp" refFor="des" refForName="hierRoot1"/>
+      <dgm:constr type="sp" for="des" forName="hierRoot3" refType="sp" refFor="des" refForName="hierRoot1"/>
+      <dgm:constr type="sp" for="des" forName="hierRoot4" refType="sp" refFor="des" refForName="hierRoot1"/>
+      <dgm:constr type="sp" for="des" forName="hierRoot5" refType="sp" refFor="des" refForName="hierRoot1"/>
+    </dgm:constrLst>
+    <dgm:ruleLst/>
+    <dgm:forEach name="Name3" axis="ch">
+      <dgm:forEach name="Name4" axis="self" ptType="node">
+        <dgm:layoutNode name="hierRoot1">
+          <dgm:alg type="hierRoot"/>
+          <dgm:shape xmlns:r="http://schemas.openxmlformats.org/officeDocument/2006/relationships" r:blip="">
+            <dgm:adjLst/>
+          </dgm:shape>
+          <dgm:presOf/>
+          <dgm:constrLst>
+            <dgm:constr type="bendDist" for="des" ptType="parTrans" refType="sp" fact="0.5"/>
+          </dgm:constrLst>
+          <dgm:ruleLst/>
+          <dgm:layoutNode name="composite">
+            <dgm:alg type="composite"/>
+            <dgm:shape xmlns:r="http://schemas.openxmlformats.org/officeDocument/2006/relationships" r:blip="">
+              <dgm:adjLst/>
+            </dgm:shape>
+            <dgm:presOf/>
+            <dgm:constrLst>
+              <dgm:constr type="w" for="ch" forName="background" refType="w" fact="0.9"/>
+              <dgm:constr type="h" for="ch" forName="background" refType="w" refFor="ch" refForName="background" fact="0.635"/>
+              <dgm:constr type="t" for="ch" forName="background"/>
+              <dgm:constr type="l" for="ch" forName="background"/>
+              <dgm:constr type="w" for="ch" forName="text" refType="w" fact="0.9"/>
+              <dgm:constr type="h" for="ch" forName="text" refType="w" refFor="ch" refForName="text" fact="0.635"/>
+              <dgm:constr type="t" for="ch" forName="text" refType="w" fact="0.095"/>
+              <dgm:constr type="l" for="ch" forName="text" refType="w" fact="0.1"/>
+            </dgm:constrLst>
+            <dgm:ruleLst/>
+            <dgm:layoutNode name="background" styleLbl="node0" moveWith="text">
+              <dgm:alg type="sp"/>
+              <dgm:shape xmlns:r="http://schemas.openxmlformats.org/officeDocument/2006/relationships" type="roundRect" r:blip="">
+                <dgm:adjLst>
+                  <dgm:adj idx="1" val="0.1"/>
+                </dgm:adjLst>
+              </dgm:shape>
+              <dgm:presOf/>
+              <dgm:constrLst/>
+              <dgm:ruleLst/>
+            </dgm:layoutNode>
+            <dgm:layoutNode name="text" styleLbl="fgAcc0">
+              <dgm:varLst>
+                <dgm:chPref val="3"/>
+              </dgm:varLst>
+              <dgm:alg type="tx"/>
+              <dgm:shape xmlns:r="http://schemas.openxmlformats.org/officeDocument/2006/relationships" type="roundRect" r:blip="">
+                <dgm:adjLst>
+                  <dgm:adj idx="1" val="0.1"/>
+                </dgm:adjLst>
+              </dgm:shape>
+              <dgm:presOf axis="self"/>
+              <dgm:constrLst>
+                <dgm:constr type="tMarg" refType="primFontSz" fact="0.3"/>
+                <dgm:constr type="bMarg" refType="primFontSz" fact="0.3"/>
+                <dgm:constr type="lMarg" refType="primFontSz" fact="0.3"/>
+                <dgm:constr type="rMarg" refType="primFontSz" fact="0.3"/>
+              </dgm:constrLst>
+              <dgm:ruleLst>
+                <dgm:rule type="primFontSz" val="5" fact="NaN" max="NaN"/>
+              </dgm:ruleLst>
+            </dgm:layoutNode>
+          </dgm:layoutNode>
+          <dgm:layoutNode name="hierChild2">
+            <dgm:choose name="Name5">
+              <dgm:if name="Name6" func="var" arg="dir" op="equ" val="norm">
+                <dgm:alg type="hierChild">
+                  <dgm:param type="linDir" val="fromL"/>
+                </dgm:alg>
+              </dgm:if>
+              <dgm:else name="Name7">
+                <dgm:alg type="hierChild">
+                  <dgm:param type="linDir" val="fromR"/>
+                </dgm:alg>
+              </dgm:else>
+            </dgm:choose>
+            <dgm:shape xmlns:r="http://schemas.openxmlformats.org/officeDocument/2006/relationships" r:blip="">
+              <dgm:adjLst/>
+            </dgm:shape>
+            <dgm:presOf/>
+            <dgm:constrLst/>
+            <dgm:ruleLst/>
+            <dgm:forEach name="Name8" axis="ch">
+              <dgm:forEach name="Name9" axis="self" ptType="parTrans" cnt="1">
+                <dgm:layoutNode name="Name10">
+                  <dgm:alg type="conn">
+                    <dgm:param type="dim" val="1D"/>
+                    <dgm:param type="endSty" val="noArr"/>
+                    <dgm:param type="connRout" val="bend"/>
+                    <dgm:param type="bendPt" val="end"/>
+                    <dgm:param type="begPts" val="bCtr"/>
+                    <dgm:param type="endPts" val="tCtr"/>
+                    <dgm:param type="srcNode" val="background"/>
+                    <dgm:param type="dstNode" val="background2"/>
+                  </dgm:alg>
+                  <dgm:shape xmlns:r="http://schemas.openxmlformats.org/officeDocument/2006/relationships" type="conn" r:blip="" zOrderOff="-999">
+                    <dgm:adjLst/>
+                  </dgm:shape>
+                  <dgm:presOf axis="self"/>
+                  <dgm:constrLst>
+                    <dgm:constr type="begPad"/>
+                    <dgm:constr type="endPad"/>
+                  </dgm:constrLst>
+                  <dgm:ruleLst/>
+                </dgm:layoutNode>
+              </dgm:forEach>
+              <dgm:forEach name="Name11" axis="self" ptType="node">
+                <dgm:layoutNode name="hierRoot2">
+                  <dgm:alg type="hierRoot"/>
+                  <dgm:shape xmlns:r="http://schemas.openxmlformats.org/officeDocument/2006/relationships" r:blip="">
+                    <dgm:adjLst/>
+                  </dgm:shape>
+                  <dgm:presOf/>
+                  <dgm:constrLst>
+                    <dgm:constr type="bendDist" for="des" ptType="parTrans" refType="sp" fact="0.5"/>
+                  </dgm:constrLst>
+                  <dgm:ruleLst/>
+                  <dgm:layoutNode name="composite2">
+                    <dgm:alg type="composite"/>
+                    <dgm:shape xmlns:r="http://schemas.openxmlformats.org/officeDocument/2006/relationships" r:blip="">
+                      <dgm:adjLst/>
+                    </dgm:shape>
+                    <dgm:presOf/>
+                    <dgm:constrLst>
+                      <dgm:constr type="w" for="ch" forName="background2" refType="w" fact="0.9"/>
+                      <dgm:constr type="h" for="ch" forName="background2" refType="w" refFor="ch" refForName="background2" fact="0.635"/>
+                      <dgm:constr type="t" for="ch" forName="background2"/>
+                      <dgm:constr type="l" for="ch" forName="background2"/>
+                      <dgm:constr type="w" for="ch" forName="text2" refType="w" fact="0.9"/>
+                      <dgm:constr type="h" for="ch" forName="text2" refType="w" refFor="ch" refForName="text2" fact="0.635"/>
+                      <dgm:constr type="t" for="ch" forName="text2" refType="w" fact="0.095"/>
+                      <dgm:constr type="l" for="ch" forName="text2" refType="w" fact="0.1"/>
+                    </dgm:constrLst>
+                    <dgm:ruleLst/>
+                    <dgm:layoutNode name="background2" moveWith="text2">
+                      <dgm:alg type="sp"/>
+                      <dgm:shape xmlns:r="http://schemas.openxmlformats.org/officeDocument/2006/relationships" type="roundRect" r:blip="">
+                        <dgm:adjLst>
+                          <dgm:adj idx="1" val="0.1"/>
+                        </dgm:adjLst>
+                      </dgm:shape>
+                      <dgm:presOf/>
+                      <dgm:constrLst/>
+                      <dgm:ruleLst/>
+                    </dgm:layoutNode>
+                    <dgm:layoutNode name="text2" styleLbl="fgAcc2">
+                      <dgm:varLst>
+                        <dgm:chPref val="3"/>
+                      </dgm:varLst>
+                      <dgm:alg type="tx"/>
+                      <dgm:shape xmlns:r="http://schemas.openxmlformats.org/officeDocument/2006/relationships" type="roundRect" r:blip="">
+                        <dgm:adjLst>
+                          <dgm:adj idx="1" val="0.1"/>
+                        </dgm:adjLst>
+                      </dgm:shape>
+                      <dgm:presOf axis="self"/>
+                      <dgm:constrLst>
+                        <dgm:constr type="tMarg" refType="primFontSz" fact="0.3"/>
+                        <dgm:constr type="bMarg" refType="primFontSz" fact="0.3"/>
+                        <dgm:constr type="lMarg" refType="primFontSz" fact="0.3"/>
+                        <dgm:constr type="rMarg" refType="primFontSz" fact="0.3"/>
+                      </dgm:constrLst>
+                      <dgm:ruleLst>
+                        <dgm:rule type="primFontSz" val="5" fact="NaN" max="NaN"/>
+                      </dgm:ruleLst>
+                    </dgm:layoutNode>
+                  </dgm:layoutNode>
+                  <dgm:layoutNode name="hierChild3">
+                    <dgm:choose name="Name12">
+                      <dgm:if name="Name13" func="var" arg="dir" op="equ" val="norm">
+                        <dgm:alg type="hierChild">
+                          <dgm:param type="linDir" val="fromL"/>
+                        </dgm:alg>
+                      </dgm:if>
+                      <dgm:else name="Name14">
+                        <dgm:alg type="hierChild">
+                          <dgm:param type="linDir" val="fromR"/>
+                        </dgm:alg>
+                      </dgm:else>
+                    </dgm:choose>
+                    <dgm:shape xmlns:r="http://schemas.openxmlformats.org/officeDocument/2006/relationships" r:blip="">
+                      <dgm:adjLst/>
+                    </dgm:shape>
+                    <dgm:presOf/>
+                    <dgm:constrLst/>
+                    <dgm:ruleLst/>
+                    <dgm:forEach name="Name15" axis="ch">
+                      <dgm:forEach name="Name16" axis="self" ptType="parTrans" cnt="1">
+                        <dgm:layoutNode name="Name17">
+                          <dgm:alg type="conn">
+                            <dgm:param type="dim" val="1D"/>
+                            <dgm:param type="endSty" val="noArr"/>
+                            <dgm:param type="connRout" val="bend"/>
+                            <dgm:param type="bendPt" val="end"/>
+                            <dgm:param type="begPts" val="bCtr"/>
+                            <dgm:param type="endPts" val="tCtr"/>
+                            <dgm:param type="srcNode" val="background2"/>
+                            <dgm:param type="dstNode" val="background3"/>
+                          </dgm:alg>
+                          <dgm:shape xmlns:r="http://schemas.openxmlformats.org/officeDocument/2006/relationships" type="conn" r:blip="" zOrderOff="-999">
+                            <dgm:adjLst/>
+                          </dgm:shape>
+                          <dgm:presOf axis="self"/>
+                          <dgm:constrLst>
+                            <dgm:constr type="begPad"/>
+                            <dgm:constr type="endPad"/>
+                          </dgm:constrLst>
+                          <dgm:ruleLst/>
+                        </dgm:layoutNode>
+                      </dgm:forEach>
+                      <dgm:forEach name="Name18" axis="self" ptType="node">
+                        <dgm:layoutNode name="hierRoot3">
+                          <dgm:alg type="hierRoot"/>
+                          <dgm:shape xmlns:r="http://schemas.openxmlformats.org/officeDocument/2006/relationships" r:blip="">
+                            <dgm:adjLst/>
+                          </dgm:shape>
+                          <dgm:presOf/>
+                          <dgm:constrLst>
+                            <dgm:constr type="bendDist" for="des" ptType="parTrans" refType="sp" fact="0.5"/>
+                          </dgm:constrLst>
+                          <dgm:ruleLst/>
+                          <dgm:layoutNode name="composite3">
+                            <dgm:alg type="composite"/>
+                            <dgm:shape xmlns:r="http://schemas.openxmlformats.org/officeDocument/2006/relationships" r:blip="">
+                              <dgm:adjLst/>
+                            </dgm:shape>
+                            <dgm:presOf/>
+                            <dgm:constrLst>
+                              <dgm:constr type="w" for="ch" forName="background3" refType="w" fact="0.9"/>
+                              <dgm:constr type="h" for="ch" forName="background3" refType="w" refFor="ch" refForName="background3" fact="0.635"/>
+                              <dgm:constr type="t" for="ch" forName="background3"/>
+                              <dgm:constr type="l" for="ch" forName="background3"/>
+                              <dgm:constr type="w" for="ch" forName="text3" refType="w" fact="0.9"/>
+                              <dgm:constr type="h" for="ch" forName="text3" refType="w" refFor="ch" refForName="text3" fact="0.635"/>
+                              <dgm:constr type="t" for="ch" forName="text3" refType="w" fact="0.095"/>
+                              <dgm:constr type="l" for="ch" forName="text3" refType="w" fact="0.1"/>
+                            </dgm:constrLst>
+                            <dgm:ruleLst/>
+                            <dgm:layoutNode name="background3" moveWith="text3">
+                              <dgm:alg type="sp"/>
+                              <dgm:shape xmlns:r="http://schemas.openxmlformats.org/officeDocument/2006/relationships" type="roundRect" r:blip="">
+                                <dgm:adjLst>
+                                  <dgm:adj idx="1" val="0.1"/>
+                                </dgm:adjLst>
+                              </dgm:shape>
+                              <dgm:presOf/>
+                              <dgm:constrLst/>
+                              <dgm:ruleLst/>
+                            </dgm:layoutNode>
+                            <dgm:layoutNode name="text3" styleLbl="fgAcc3">
+                              <dgm:varLst>
+                                <dgm:chPref val="3"/>
+                              </dgm:varLst>
+                              <dgm:alg type="tx"/>
+                              <dgm:shape xmlns:r="http://schemas.openxmlformats.org/officeDocument/2006/relationships" type="roundRect" r:blip="">
+                                <dgm:adjLst>
+                                  <dgm:adj idx="1" val="0.1"/>
+                                </dgm:adjLst>
+                              </dgm:shape>
+                              <dgm:presOf axis="self"/>
+                              <dgm:constrLst>
+                                <dgm:constr type="tMarg" refType="primFontSz" fact="0.3"/>
+                                <dgm:constr type="bMarg" refType="primFontSz" fact="0.3"/>
+                                <dgm:constr type="lMarg" refType="primFontSz" fact="0.3"/>
+                                <dgm:constr type="rMarg" refType="primFontSz" fact="0.3"/>
+                              </dgm:constrLst>
+                              <dgm:ruleLst>
+                                <dgm:rule type="primFontSz" val="5" fact="NaN" max="NaN"/>
+                              </dgm:ruleLst>
+                            </dgm:layoutNode>
+                          </dgm:layoutNode>
+                          <dgm:layoutNode name="hierChild4">
+                            <dgm:choose name="Name19">
+                              <dgm:if name="Name20" func="var" arg="dir" op="equ" val="norm">
+                                <dgm:alg type="hierChild">
+                                  <dgm:param type="linDir" val="fromL"/>
+                                </dgm:alg>
+                              </dgm:if>
+                              <dgm:else name="Name21">
+                                <dgm:alg type="hierChild">
+                                  <dgm:param type="linDir" val="fromR"/>
+                                </dgm:alg>
+                              </dgm:else>
+                            </dgm:choose>
+                            <dgm:shape xmlns:r="http://schemas.openxmlformats.org/officeDocument/2006/relationships" r:blip="">
+                              <dgm:adjLst/>
+                            </dgm:shape>
+                            <dgm:presOf/>
+                            <dgm:constrLst/>
+                            <dgm:ruleLst/>
+                            <dgm:forEach name="repeat" axis="ch">
+                              <dgm:forEach name="Name22" axis="self" ptType="parTrans" cnt="1">
+                                <dgm:layoutNode name="Name23">
+                                  <dgm:choose name="Name24">
+                                    <dgm:if name="Name25" axis="self" func="depth" op="lte" val="4">
+                                      <dgm:alg type="conn">
+                                        <dgm:param type="dim" val="1D"/>
+                                        <dgm:param type="endSty" val="noArr"/>
+                                        <dgm:param type="connRout" val="bend"/>
+                                        <dgm:param type="bendPt" val="end"/>
+                                        <dgm:param type="begPts" val="bCtr"/>
+                                        <dgm:param type="endPts" val="tCtr"/>
+                                        <dgm:param type="srcNode" val="background3"/>
+                                        <dgm:param type="dstNode" val="background4"/>
+                                      </dgm:alg>
+                                    </dgm:if>
+                                    <dgm:else name="Name26">
+                                      <dgm:alg type="conn">
+                                        <dgm:param type="dim" val="1D"/>
+                                        <dgm:param type="endSty" val="noArr"/>
+                                        <dgm:param type="connRout" val="bend"/>
+                                        <dgm:param type="bendPt" val="end"/>
+                                        <dgm:param type="begPts" val="bCtr"/>
+                                        <dgm:param type="endPts" val="tCtr"/>
+                                        <dgm:param type="srcNode" val="background4"/>
+                                        <dgm:param type="dstNode" val="background4"/>
+                                      </dgm:alg>
+                                    </dgm:else>
+                                  </dgm:choose>
+                                  <dgm:shape xmlns:r="http://schemas.openxmlformats.org/officeDocument/2006/relationships" type="conn" r:blip="" zOrderOff="-999">
+                                    <dgm:adjLst/>
+                                  </dgm:shape>
+                                  <dgm:presOf axis="self"/>
+                                  <dgm:constrLst>
+                                    <dgm:constr type="begPad"/>
+                                    <dgm:constr type="endPad"/>
+                                  </dgm:constrLst>
+                                  <dgm:ruleLst/>
+                                </dgm:layoutNode>
+                              </dgm:forEach>
+                              <dgm:forEach name="Name27" axis="self" ptType="node">
+                                <dgm:layoutNode name="hierRoot4">
+                                  <dgm:alg type="hierRoot"/>
+                                  <dgm:shape xmlns:r="http://schemas.openxmlformats.org/officeDocument/2006/relationships" r:blip="">
+                                    <dgm:adjLst/>
+                                  </dgm:shape>
+                                  <dgm:presOf/>
+                                  <dgm:constrLst>
+                                    <dgm:constr type="bendDist" for="des" ptType="parTrans" refType="sp" fact="0.5"/>
+                                  </dgm:constrLst>
+                                  <dgm:ruleLst/>
+                                  <dgm:layoutNode name="composite4">
+                                    <dgm:alg type="composite"/>
+                                    <dgm:shape xmlns:r="http://schemas.openxmlformats.org/officeDocument/2006/relationships" r:blip="">
+                                      <dgm:adjLst/>
+                                    </dgm:shape>
+                                    <dgm:presOf/>
+                                    <dgm:constrLst>
+                                      <dgm:constr type="w" for="ch" forName="background4" refType="w" fact="0.9"/>
+                                      <dgm:constr type="h" for="ch" forName="background4" refType="w" refFor="ch" refForName="background4" fact="0.635"/>
+                                      <dgm:constr type="t" for="ch" forName="background4"/>
+                                      <dgm:constr type="l" for="ch" forName="background4"/>
+                                      <dgm:constr type="w" for="ch" forName="text4" refType="w" fact="0.9"/>
+                                      <dgm:constr type="h" for="ch" forName="text4" refType="w" refFor="ch" refForName="text4" fact="0.635"/>
+                                      <dgm:constr type="t" for="ch" forName="text4" refType="w" fact="0.095"/>
+                                      <dgm:constr type="l" for="ch" forName="text4" refType="w" fact="0.1"/>
+                                    </dgm:constrLst>
+                                    <dgm:ruleLst/>
+                                    <dgm:layoutNode name="background4" moveWith="text4">
+                                      <dgm:alg type="sp"/>
+                                      <dgm:shape xmlns:r="http://schemas.openxmlformats.org/officeDocument/2006/relationships" type="roundRect" r:blip="">
+                                        <dgm:adjLst>
+                                          <dgm:adj idx="1" val="0.1"/>
+                                        </dgm:adjLst>
+                                      </dgm:shape>
+                                      <dgm:presOf/>
+                                      <dgm:constrLst/>
+                                      <dgm:ruleLst/>
+                                    </dgm:layoutNode>
+                                    <dgm:layoutNode name="text4" styleLbl="fgAcc4">
+                                      <dgm:varLst>
+                                        <dgm:chPref val="3"/>
+                                      </dgm:varLst>
+                                      <dgm:alg type="tx"/>
+                                      <dgm:shape xmlns:r="http://schemas.openxmlformats.org/officeDocument/2006/relationships" type="roundRect" r:blip="">
+                                        <dgm:adjLst>
+                                          <dgm:adj idx="1" val="0.1"/>
+                                        </dgm:adjLst>
+                                      </dgm:shape>
+                                      <dgm:presOf axis="self"/>
+                                      <dgm:constrLst>
+                                        <dgm:constr type="tMarg" refType="primFontSz" fact="0.3"/>
+                                        <dgm:constr type="bMarg" refType="primFontSz" fact="0.3"/>
+                                        <dgm:constr type="lMarg" refType="primFontSz" fact="0.3"/>
+                                        <dgm:constr type="rMarg" refType="primFontSz" fact="0.3"/>
+                                      </dgm:constrLst>
+                                      <dgm:ruleLst>
+                                        <dgm:rule type="primFontSz" val="5" fact="NaN" max="NaN"/>
+                                      </dgm:ruleLst>
+                                    </dgm:layoutNode>
+                                  </dgm:layoutNode>
+                                  <dgm:layoutNode name="hierChild5">
+                                    <dgm:choose name="Name28">
+                                      <dgm:if name="Name29" func="var" arg="dir" op="equ" val="norm">
+                                        <dgm:alg type="hierChild">
+                                          <dgm:param type="linDir" val="fromL"/>
+                                        </dgm:alg>
+                                      </dgm:if>
+                                      <dgm:else name="Name30">
+                                        <dgm:alg type="hierChild">
+                                          <dgm:param type="linDir" val="fromR"/>
+                                        </dgm:alg>
+                                      </dgm:else>
+                                    </dgm:choose>
+                                    <dgm:shape xmlns:r="http://schemas.openxmlformats.org/officeDocument/2006/relationships" r:blip="">
+                                      <dgm:adjLst/>
+                                    </dgm:shape>
+                                    <dgm:presOf/>
+                                    <dgm:constrLst/>
+                                    <dgm:ruleLst/>
+                                    <dgm:forEach name="Name31" ref="repeat"/>
+                                  </dgm:layoutNode>
+                                </dgm:layoutNode>
+                              </dgm:forEach>
+                            </dgm:forEach>
+                          </dgm:layoutNode>
+                        </dgm:layoutNode>
+                      </dgm:forEach>
+                    </dgm:forEach>
+                  </dgm:layoutNode>
+                </dgm:layoutNode>
+              </dgm:forEach>
+            </dgm:forEach>
+          </dgm:layoutNode>
+        </dgm:layoutNode>
+      </dgm:forEach>
+    </dgm:forEach>
+  </dgm:layoutNode>
+</dgm:layoutDef>
+</file>
+
+<file path=ppt/diagrams/quickStyle1.xml><?xml version="1.0" encoding="utf-8"?>
+<dgm:styleDef xmlns:dgm="http://schemas.openxmlformats.org/drawingml/2006/diagram" xmlns:a="http://schemas.openxmlformats.org/drawingml/2006/main" uniqueId="urn:microsoft.com/office/officeart/2005/8/quickstyle/simple1">
+  <dgm:title val=""/>
+  <dgm:desc val=""/>
+  <dgm:catLst>
+    <dgm:cat type="simple" pri="10100"/>
+  </dgm:catLst>
+  <dgm:scene3d>
+    <a:camera prst="orthographicFront"/>
+    <a:lightRig rig="threePt" dir="t"/>
+  </dgm:scene3d>
+  <dgm:styleLbl name="node0">
+    <dgm:scene3d>
+      <a:camera prst="orthographicFront"/>
+      <a:lightRig rig="threePt" dir="t"/>
+    </dgm:scene3d>
+    <dgm:sp3d/>
+    <dgm:txPr/>
+    <dgm:style>
+      <a:lnRef idx="2">
+        <a:scrgbClr r="0" g="0" b="0"/>
+      </a:lnRef>
+      <a:fillRef idx="1">
+        <a:scrgbClr r="0" g="0" b="0"/>
+      </a:fillRef>
+      <a:effectRef idx="0">
+        <a:scrgbClr r="0" g="0" b="0"/>
+      </a:effectRef>
+      <a:fontRef idx="minor">
+        <a:schemeClr val="lt1"/>
+      </a:fontRef>
+    </dgm:style>
+  </dgm:styleLbl>
+  <dgm:styleLbl name="lnNode1">
+    <dgm:scene3d>
+      <a:camera prst="orthographicFront"/>
+      <a:lightRig rig="threePt" dir="t"/>
+    </dgm:scene3d>
+    <dgm:sp3d/>
+    <dgm:txPr/>
+    <dgm:style>
+      <a:lnRef idx="2">
+        <a:scrgbClr r="0" g="0" b="0"/>
+      </a:lnRef>
+      <a:fillRef idx="1">
+        <a:scrgbClr r="0" g="0" b="0"/>
+      </a:fillRef>
+      <a:effectRef idx="0">
+        <a:scrgbClr r="0" g="0" b="0"/>
+      </a:effectRef>
+      <a:fontRef idx="minor">
+        <a:schemeClr val="lt1"/>
+      </a:fontRef>
+    </dgm:style>
+  </dgm:styleLbl>
+  <dgm:styleLbl name="vennNode1">
+    <dgm:scene3d>
+      <a:camera prst="orthographicFront"/>
+      <a:lightRig rig="threePt" dir="t"/>
+    </dgm:scene3d>
+    <dgm:sp3d/>
+    <dgm:txPr/>
+    <dgm:style>
+      <a:lnRef idx="2">
+        <a:scrgbClr r="0" g="0" b="0"/>
+      </a:lnRef>
+      <a:fillRef idx="1">
+        <a:scrgbClr r="0" g="0" b="0"/>
+      </a:fillRef>
+      <a:effectRef idx="0">
+        <a:scrgbClr r="0" g="0" b="0"/>
+      </a:effectRef>
+      <a:fontRef idx="minor">
+        <a:schemeClr val="tx1"/>
+      </a:fontRef>
+    </dgm:style>
+  </dgm:styleLbl>
+  <dgm:styleLbl name="alignNode1">
+    <dgm:scene3d>
+      <a:camera prst="orthographicFront"/>
+      <a:lightRig rig="threePt" dir="t"/>
+    </dgm:scene3d>
+    <dgm:sp3d/>
+    <dgm:txPr/>
+    <dgm:style>
+      <a:lnRef idx="2">
+        <a:scrgbClr r="0" g="0" b="0"/>
+      </a:lnRef>
+      <a:fillRef idx="1">
+        <a:scrgbClr r="0" g="0" b="0"/>
+      </a:fillRef>
+      <a:effectRef idx="0">
+        <a:scrgbClr r="0" g="0" b="0"/>
+      </a:effectRef>
+      <a:fontRef idx="minor">
+        <a:schemeClr val="lt1"/>
+      </a:fontRef>
+    </dgm:style>
+  </dgm:styleLbl>
+  <dgm:styleLbl name="node1">
+    <dgm:scene3d>
+      <a:camera prst="orthographicFront"/>
+      <a:lightRig rig="threePt" dir="t"/>
+    </dgm:scene3d>
+    <dgm:sp3d/>
+    <dgm:txPr/>
+    <dgm:style>
+      <a:lnRef idx="2">
+        <a:scrgbClr r="0" g="0" b="0"/>
+      </a:lnRef>
+      <a:fillRef idx="1">
+        <a:scrgbClr r="0" g="0" b="0"/>
+      </a:fillRef>
+      <a:effectRef idx="0">
+        <a:scrgbClr r="0" g="0" b="0"/>
+      </a:effectRef>
+      <a:fontRef idx="minor">
+        <a:schemeClr val="lt1"/>
+      </a:fontRef>
+    </dgm:style>
+  </dgm:styleLbl>
+  <dgm:styleLbl name="node2">
+    <dgm:scene3d>
+      <a:camera prst="orthographicFront"/>
+      <a:lightRig rig="threePt" dir="t"/>
+    </dgm:scene3d>
+    <dgm:sp3d/>
+    <dgm:txPr/>
+    <dgm:style>
+      <a:lnRef idx="2">
+        <a:scrgbClr r="0" g="0" b="0"/>
+      </a:lnRef>
+      <a:fillRef idx="1">
+        <a:scrgbClr r="0" g="0" b="0"/>
+      </a:fillRef>
+      <a:effectRef idx="0">
+        <a:scrgbClr r="0" g="0" b="0"/>
+      </a:effectRef>
+      <a:fontRef idx="minor">
+        <a:schemeClr val="lt1"/>
+      </a:fontRef>
+    </dgm:style>
+  </dgm:styleLbl>
+  <dgm:styleLbl name="node3">
+    <dgm:scene3d>
+      <a:camera prst="orthographicFront"/>
+      <a:lightRig rig="threePt" dir="t"/>
+    </dgm:scene3d>
+    <dgm:sp3d/>
+    <dgm:txPr/>
+    <dgm:style>
+      <a:lnRef idx="2">
+        <a:scrgbClr r="0" g="0" b="0"/>
+      </a:lnRef>
+      <a:fillRef idx="1">
+        <a:scrgbClr r="0" g="0" b="0"/>
+      </a:fillRef>
+      <a:effectRef idx="0">
+        <a:scrgbClr r="0" g="0" b="0"/>
+      </a:effectRef>
+      <a:fontRef idx="minor">
+        <a:schemeClr val="lt1"/>
+      </a:fontRef>
+    </dgm:style>
+  </dgm:styleLbl>
+  <dgm:styleLbl name="node4">
+    <dgm:scene3d>
+      <a:camera prst="orthographicFront"/>
+      <a:lightRig rig="threePt" dir="t"/>
+    </dgm:scene3d>
+    <dgm:sp3d/>
+    <dgm:txPr/>
+    <dgm:style>
+      <a:lnRef idx="2">
+        <a:scrgbClr r="0" g="0" b="0"/>
+      </a:lnRef>
+      <a:fillRef idx="1">
+        <a:scrgbClr r="0" g="0" b="0"/>
+      </a:fillRef>
+      <a:effectRef idx="0">
+        <a:scrgbClr r="0" g="0" b="0"/>
+      </a:effectRef>
+      <a:fontRef idx="minor">
+        <a:schemeClr val="lt1"/>
+      </a:fontRef>
+    </dgm:style>
+  </dgm:styleLbl>
+  <dgm:styleLbl name="fgImgPlace1">
+    <dgm:scene3d>
+      <a:camera prst="orthographicFront"/>
+      <a:lightRig rig="threePt" dir="t"/>
+    </dgm:scene3d>
+    <dgm:sp3d/>
+    <dgm:txPr/>
+    <dgm:style>
+      <a:lnRef idx="2">
+        <a:scrgbClr r="0" g="0" b="0"/>
+      </a:lnRef>
+      <a:fillRef idx="1">
+        <a:scrgbClr r="0" g="0" b="0"/>
+      </a:fillRef>
+      <a:effectRef idx="0">
+        <a:scrgbClr r="0" g="0" b="0"/>
+      </a:effectRef>
+      <a:fontRef idx="minor"/>
+    </dgm:style>
+  </dgm:styleLbl>
+  <dgm:styleLbl name="alignImgPlace1">
+    <dgm:scene3d>
+      <a:camera prst="orthographicFront"/>
+      <a:lightRig rig="threePt" dir="t"/>
+    </dgm:scene3d>
+    <dgm:sp3d/>
+    <dgm:txPr/>
+    <dgm:style>
+      <a:lnRef idx="2">
+        <a:scrgbClr r="0" g="0" b="0"/>
+      </a:lnRef>
+      <a:fillRef idx="1">
+        <a:scrgbClr r="0" g="0" b="0"/>
+      </a:fillRef>
+      <a:effectRef idx="0">
+        <a:scrgbClr r="0" g="0" b="0"/>
+      </a:effectRef>
+      <a:fontRef idx="minor"/>
+    </dgm:style>
+  </dgm:styleLbl>
+  <dgm:styleLbl name="bgImgPlace1">
+    <dgm:scene3d>
+      <a:camera prst="orthographicFront"/>
+      <a:lightRig rig="threePt" dir="t"/>
+    </dgm:scene3d>
+    <dgm:sp3d/>
+    <dgm:txPr/>
+    <dgm:style>
+      <a:lnRef idx="2">
+        <a:scrgbClr r="0" g="0" b="0"/>
+      </a:lnRef>
+      <a:fillRef idx="1">
+        <a:scrgbClr r="0" g="0" b="0"/>
+      </a:fillRef>
+      <a:effectRef idx="0">
+        <a:scrgbClr r="0" g="0" b="0"/>
+      </a:effectRef>
+      <a:fontRef idx="minor"/>
+    </dgm:style>
+  </dgm:styleLbl>
+  <dgm:styleLbl name="sibTrans2D1">
+    <dgm:scene3d>
+      <a:camera prst="orthographicFront"/>
+      <a:lightRig rig="threePt" dir="t"/>
+    </dgm:scene3d>
+    <dgm:sp3d/>
+    <dgm:txPr/>
+    <dgm:style>
+      <a:lnRef idx="0">
+        <a:scrgbClr r="0" g="0" b="0"/>
+      </a:lnRef>
+      <a:fillRef idx="1">
+        <a:scrgbClr r="0" g="0" b="0"/>
+      </a:fillRef>
+      <a:effectRef idx="0">
+        <a:scrgbClr r="0" g="0" b="0"/>
+      </a:effectRef>
+      <a:fontRef idx="minor">
+        <a:schemeClr val="lt1"/>
+      </a:fontRef>
+    </dgm:style>
+  </dgm:styleLbl>
+  <dgm:styleLbl name="fgSibTrans2D1">
+    <dgm:scene3d>
+      <a:camera prst="orthographicFront"/>
+      <a:lightRig rig="threePt" dir="t"/>
+    </dgm:scene3d>
+    <dgm:sp3d/>
+    <dgm:txPr/>
+    <dgm:style>
+      <a:lnRef idx="0">
+        <a:scrgbClr r="0" g="0" b="0"/>
+      </a:lnRef>
+      <a:fillRef idx="1">
+        <a:scrgbClr r="0" g="0" b="0"/>
+      </a:fillRef>
+      <a:effectRef idx="0">
+        <a:scrgbClr r="0" g="0" b="0"/>
+      </a:effectRef>
+      <a:fontRef idx="minor">
+        <a:schemeClr val="lt1"/>
+      </a:fontRef>
+    </dgm:style>
+  </dgm:styleLbl>
+  <dgm:styleLbl name="bgSibTrans2D1">
+    <dgm:scene3d>
+      <a:camera prst="orthographicFront"/>
+      <a:lightRig rig="threePt" dir="t"/>
+    </dgm:scene3d>
+    <dgm:sp3d/>
+    <dgm:txPr/>
+    <dgm:style>
+      <a:lnRef idx="0">
+        <a:scrgbClr r="0" g="0" b="0"/>
+      </a:lnRef>
+      <a:fillRef idx="1">
+        <a:scrgbClr r="0" g="0" b="0"/>
+      </a:fillRef>
+      <a:effectRef idx="0">
+        <a:scrgbClr r="0" g="0" b="0"/>
+      </a:effectRef>
+      <a:fontRef idx="minor">
+        <a:schemeClr val="lt1"/>
+      </a:fontRef>
+    </dgm:style>
+  </dgm:styleLbl>
+  <dgm:styleLbl name="sibTrans1D1">
+    <dgm:scene3d>
+      <a:camera prst="orthographicFront"/>
+      <a:lightRig rig="threePt" dir="t"/>
+    </dgm:scene3d>
+    <dgm:sp3d/>
+    <dgm:txPr/>
+    <dgm:style>
+      <a:lnRef idx="1">
+        <a:scrgbClr r="0" g="0" b="0"/>
+      </a:lnRef>
+      <a:fillRef idx="0">
+        <a:scrgbClr r="0" g="0" b="0"/>
+      </a:fillRef>
+      <a:effectRef idx="0">
+        <a:scrgbClr r="0" g="0" b="0"/>
+      </a:effectRef>
+      <a:fontRef idx="minor"/>
+    </dgm:style>
+  </dgm:styleLbl>
+  <dgm:styleLbl name="callout">
+    <dgm:scene3d>
+      <a:camera prst="orthographicFront"/>
+      <a:lightRig rig="threePt" dir="t"/>
+    </dgm:scene3d>
+    <dgm:sp3d/>
+    <dgm:txPr/>
+    <dgm:style>
+      <a:lnRef idx="2">
+        <a:scrgbClr r="0" g="0" b="0"/>
+      </a:lnRef>
+      <a:fillRef idx="1">
+        <a:scrgbClr r="0" g="0" b="0"/>
+      </a:fillRef>
+      <a:effectRef idx="0">
+        <a:scrgbClr r="0" g="0" b="0"/>
+      </a:effectRef>
+      <a:fontRef idx="minor"/>
+    </dgm:style>
+  </dgm:styleLbl>
+  <dgm:styleLbl name="asst0">
+    <dgm:scene3d>
+      <a:camera prst="orthographicFront"/>
+      <a:lightRig rig="threePt" dir="t"/>
+    </dgm:scene3d>
+    <dgm:sp3d/>
+    <dgm:txPr/>
+    <dgm:style>
+      <a:lnRef idx="2">
+        <a:scrgbClr r="0" g="0" b="0"/>
+      </a:lnRef>
+      <a:fillRef idx="1">
+        <a:scrgbClr r="0" g="0" b="0"/>
+      </a:fillRef>
+      <a:effectRef idx="0">
+        <a:scrgbClr r="0" g="0" b="0"/>
+      </a:effectRef>
+      <a:fontRef idx="minor">
+        <a:schemeClr val="lt1"/>
+      </a:fontRef>
+    </dgm:style>
+  </dgm:styleLbl>
+  <dgm:styleLbl name="asst1">
+    <dgm:scene3d>
+      <a:camera prst="orthographicFront"/>
+      <a:lightRig rig="threePt" dir="t"/>
+    </dgm:scene3d>
+    <dgm:sp3d/>
+    <dgm:txPr/>
+    <dgm:style>
+      <a:lnRef idx="2">
+        <a:scrgbClr r="0" g="0" b="0"/>
+      </a:lnRef>
+      <a:fillRef idx="1">
+        <a:scrgbClr r="0" g="0" b="0"/>
+      </a:fillRef>
+      <a:effectRef idx="0">
+        <a:scrgbClr r="0" g="0" b="0"/>
+      </a:effectRef>
+      <a:fontRef idx="minor">
+        <a:schemeClr val="lt1"/>
+      </a:fontRef>
+    </dgm:style>
+  </dgm:styleLbl>
+  <dgm:styleLbl name="asst2">
+    <dgm:scene3d>
+      <a:camera prst="orthographicFront"/>
+      <a:lightRig rig="threePt" dir="t"/>
+    </dgm:scene3d>
+    <dgm:sp3d/>
+    <dgm:txPr/>
+    <dgm:style>
+      <a:lnRef idx="2">
+        <a:scrgbClr r="0" g="0" b="0"/>
+      </a:lnRef>
+      <a:fillRef idx="1">
+        <a:scrgbClr r="0" g="0" b="0"/>
+      </a:fillRef>
+      <a:effectRef idx="0">
+        <a:scrgbClr r="0" g="0" b="0"/>
+      </a:effectRef>
+      <a:fontRef idx="minor">
+        <a:schemeClr val="lt1"/>
+      </a:fontRef>
+    </dgm:style>
+  </dgm:styleLbl>
+  <dgm:styleLbl name="asst3">
+    <dgm:scene3d>
+      <a:camera prst="orthographicFront"/>
+      <a:lightRig rig="threePt" dir="t"/>
+    </dgm:scene3d>
+    <dgm:sp3d/>
+    <dgm:txPr/>
+    <dgm:style>
+      <a:lnRef idx="2">
+        <a:scrgbClr r="0" g="0" b="0"/>
+      </a:lnRef>
+      <a:fillRef idx="1">
+        <a:scrgbClr r="0" g="0" b="0"/>
+      </a:fillRef>
+      <a:effectRef idx="0">
+        <a:scrgbClr r="0" g="0" b="0"/>
+      </a:effectRef>
+      <a:fontRef idx="minor">
+        <a:schemeClr val="lt1"/>
+      </a:fontRef>
+    </dgm:style>
+  </dgm:styleLbl>
+  <dgm:styleLbl name="asst4">
+    <dgm:scene3d>
+      <a:camera prst="orthographicFront"/>
+      <a:lightRig rig="threePt" dir="t"/>
+    </dgm:scene3d>
+    <dgm:sp3d/>
+    <dgm:txPr/>
+    <dgm:style>
+      <a:lnRef idx="2">
+        <a:scrgbClr r="0" g="0" b="0"/>
+      </a:lnRef>
+      <a:fillRef idx="1">
+        <a:scrgbClr r="0" g="0" b="0"/>
+      </a:fillRef>
+      <a:effectRef idx="0">
+        <a:scrgbClr r="0" g="0" b="0"/>
+      </a:effectRef>
+      <a:fontRef idx="minor">
+        <a:schemeClr val="lt1"/>
+      </a:fontRef>
+    </dgm:style>
+  </dgm:styleLbl>
+  <dgm:styleLbl name="parChTrans2D1">
+    <dgm:scene3d>
+      <a:camera prst="orthographicFront"/>
+      <a:lightRig rig="threePt" dir="t"/>
+    </dgm:scene3d>
+    <dgm:sp3d/>
+    <dgm:txPr/>
+    <dgm:style>
+      <a:lnRef idx="2">
+        <a:scrgbClr r="0" g="0" b="0"/>
+      </a:lnRef>
+      <a:fillRef idx="1">
+        <a:scrgbClr r="0" g="0" b="0"/>
+      </a:fillRef>
+      <a:effectRef idx="0">
+        <a:scrgbClr r="0" g="0" b="0"/>
+      </a:effectRef>
+      <a:fontRef idx="minor">
+        <a:schemeClr val="lt1"/>
+      </a:fontRef>
+    </dgm:style>
+  </dgm:styleLbl>
+  <dgm:styleLbl name="parChTrans2D2">
+    <dgm:scene3d>
+      <a:camera prst="orthographicFront"/>
+      <a:lightRig rig="threePt" dir="t"/>
+    </dgm:scene3d>
+    <dgm:sp3d/>
+    <dgm:txPr/>
+    <dgm:style>
+      <a:lnRef idx="2">
+        <a:scrgbClr r="0" g="0" b="0"/>
+      </a:lnRef>
+      <a:fillRef idx="1">
+        <a:scrgbClr r="0" g="0" b="0"/>
+      </a:fillRef>
+      <a:effectRef idx="0">
+        <a:scrgbClr r="0" g="0" b="0"/>
+      </a:effectRef>
+      <a:fontRef idx="minor">
+        <a:schemeClr val="lt1"/>
+      </a:fontRef>
+    </dgm:style>
+  </dgm:styleLbl>
+  <dgm:styleLbl name="parChTrans2D3">
+    <dgm:scene3d>
+      <a:camera prst="orthographicFront"/>
+      <a:lightRig rig="threePt" dir="t"/>
+    </dgm:scene3d>
+    <dgm:sp3d/>
+    <dgm:txPr/>
+    <dgm:style>
+      <a:lnRef idx="2">
+        <a:scrgbClr r="0" g="0" b="0"/>
+      </a:lnRef>
+      <a:fillRef idx="1">
+        <a:scrgbClr r="0" g="0" b="0"/>
+      </a:fillRef>
+      <a:effectRef idx="0">
+        <a:scrgbClr r="0" g="0" b="0"/>
+      </a:effectRef>
+      <a:fontRef idx="minor">
+        <a:schemeClr val="lt1"/>
+      </a:fontRef>
+    </dgm:style>
+  </dgm:styleLbl>
+  <dgm:styleLbl name="parChTrans2D4">
+    <dgm:scene3d>
+      <a:camera prst="orthographicFront"/>
+      <a:lightRig rig="threePt" dir="t"/>
+    </dgm:scene3d>
+    <dgm:sp3d/>
+    <dgm:txPr/>
+    <dgm:style>
+      <a:lnRef idx="2">
+        <a:scrgbClr r="0" g="0" b="0"/>
+      </a:lnRef>
+      <a:fillRef idx="1">
+        <a:scrgbClr r="0" g="0" b="0"/>
+      </a:fillRef>
+      <a:effectRef idx="0">
+        <a:scrgbClr r="0" g="0" b="0"/>
+      </a:effectRef>
+      <a:fontRef idx="minor">
+        <a:schemeClr val="lt1"/>
+      </a:fontRef>
+    </dgm:style>
+  </dgm:styleLbl>
+  <dgm:styleLbl name="parChTrans1D1">
+    <dgm:scene3d>
+      <a:camera prst="orthographicFront"/>
+      <a:lightRig rig="threePt" dir="t"/>
+    </dgm:scene3d>
+    <dgm:sp3d/>
+    <dgm:txPr/>
+    <dgm:style>
+      <a:lnRef idx="2">
+        <a:scrgbClr r="0" g="0" b="0"/>
+      </a:lnRef>
+      <a:fillRef idx="0">
+        <a:scrgbClr r="0" g="0" b="0"/>
+      </a:fillRef>
+      <a:effectRef idx="0">
+        <a:scrgbClr r="0" g="0" b="0"/>
+      </a:effectRef>
+      <a:fontRef idx="minor"/>
+    </dgm:style>
+  </dgm:styleLbl>
+  <dgm:styleLbl name="parChTrans1D2">
+    <dgm:scene3d>
+      <a:camera prst="orthographicFront"/>
+      <a:lightRig rig="threePt" dir="t"/>
+    </dgm:scene3d>
+    <dgm:sp3d/>
+    <dgm:txPr/>
+    <dgm:style>
+      <a:lnRef idx="2">
+        <a:scrgbClr r="0" g="0" b="0"/>
+      </a:lnRef>
+      <a:fillRef idx="0">
+        <a:scrgbClr r="0" g="0" b="0"/>
+      </a:fillRef>
+      <a:effectRef idx="0">
+        <a:scrgbClr r="0" g="0" b="0"/>
+      </a:effectRef>
+      <a:fontRef idx="minor"/>
+    </dgm:style>
+  </dgm:styleLbl>
+  <dgm:styleLbl name="parChTrans1D3">
+    <dgm:scene3d>
+      <a:camera prst="orthographicFront"/>
+      <a:lightRig rig="threePt" dir="t"/>
+    </dgm:scene3d>
+    <dgm:sp3d/>
+    <dgm:txPr/>
+    <dgm:style>
+      <a:lnRef idx="2">
+        <a:scrgbClr r="0" g="0" b="0"/>
+      </a:lnRef>
+      <a:fillRef idx="0">
+        <a:scrgbClr r="0" g="0" b="0"/>
+      </a:fillRef>
+      <a:effectRef idx="0">
+        <a:scrgbClr r="0" g="0" b="0"/>
+      </a:effectRef>
+      <a:fontRef idx="minor"/>
+    </dgm:style>
+  </dgm:styleLbl>
+  <dgm:styleLbl name="parChTrans1D4">
+    <dgm:scene3d>
+      <a:camera prst="orthographicFront"/>
+      <a:lightRig rig="threePt" dir="t"/>
+    </dgm:scene3d>
+    <dgm:sp3d/>
+    <dgm:txPr/>
+    <dgm:style>
+      <a:lnRef idx="2">
+        <a:scrgbClr r="0" g="0" b="0"/>
+      </a:lnRef>
+      <a:fillRef idx="0">
+        <a:scrgbClr r="0" g="0" b="0"/>
+      </a:fillRef>
+      <a:effectRef idx="0">
+        <a:scrgbClr r="0" g="0" b="0"/>
+      </a:effectRef>
+      <a:fontRef idx="minor"/>
+    </dgm:style>
+  </dgm:styleLbl>
+  <dgm:styleLbl name="fgAcc1">
+    <dgm:scene3d>
+      <a:camera prst="orthographicFront"/>
+      <a:lightRig rig="threePt" dir="t"/>
+    </dgm:scene3d>
+    <dgm:sp3d/>
+    <dgm:txPr/>
+    <dgm:style>
+      <a:lnRef idx="2">
+        <a:scrgbClr r="0" g="0" b="0"/>
+      </a:lnRef>
+      <a:fillRef idx="1">
+        <a:scrgbClr r="0" g="0" b="0"/>
+      </a:fillRef>
+      <a:effectRef idx="0">
+        <a:scrgbClr r="0" g="0" b="0"/>
+      </a:effectRef>
+      <a:fontRef idx="minor"/>
+    </dgm:style>
+  </dgm:styleLbl>
+  <dgm:styleLbl name="conFgAcc1">
+    <dgm:scene3d>
+      <a:camera prst="orthographicFront"/>
+      <a:lightRig rig="threePt" dir="t"/>
+    </dgm:scene3d>
+    <dgm:sp3d/>
+    <dgm:txPr/>
+    <dgm:style>
+      <a:lnRef idx="2">
+        <a:scrgbClr r="0" g="0" b="0"/>
+      </a:lnRef>
+      <a:fillRef idx="1">
+        <a:scrgbClr r="0" g="0" b="0"/>
+      </a:fillRef>
+      <a:effectRef idx="0">
+        <a:scrgbClr r="0" g="0" b="0"/>
+      </a:effectRef>
+      <a:fontRef idx="minor"/>
+    </dgm:style>
+  </dgm:styleLbl>
+  <dgm:styleLbl name="alignAcc1">
+    <dgm:scene3d>
+      <a:camera prst="orthographicFront"/>
+      <a:lightRig rig="threePt" dir="t"/>
+    </dgm:scene3d>
+    <dgm:sp3d/>
+    <dgm:txPr/>
+    <dgm:style>
+      <a:lnRef idx="2">
+        <a:scrgbClr r="0" g="0" b="0"/>
+      </a:lnRef>
+      <a:fillRef idx="1">
+        <a:scrgbClr r="0" g="0" b="0"/>
+      </a:fillRef>
+      <a:effectRef idx="0">
+        <a:scrgbClr r="0" g="0" b="0"/>
+      </a:effectRef>
+      <a:fontRef idx="minor"/>
+    </dgm:style>
+  </dgm:styleLbl>
+  <dgm:styleLbl name="trAlignAcc1">
+    <dgm:scene3d>
+      <a:camera prst="orthographicFront"/>
+      <a:lightRig rig="threePt" dir="t"/>
+    </dgm:scene3d>
+    <dgm:sp3d/>
+    <dgm:txPr/>
+    <dgm:style>
+      <a:lnRef idx="1">
+        <a:scrgbClr r="0" g="0" b="0"/>
+      </a:lnRef>
+      <a:fillRef idx="1">
+        <a:scrgbClr r="0" g="0" b="0"/>
+      </a:fillRef>
+      <a:effectRef idx="0">
+        <a:scrgbClr r="0" g="0" b="0"/>
+      </a:effectRef>
+      <a:fontRef idx="minor"/>
+    </dgm:style>
+  </dgm:styleLbl>
+  <dgm:styleLbl name="bgAcc1">
+    <dgm:scene3d>
+      <a:camera prst="orthographicFront"/>
+      <a:lightRig rig="threePt" dir="t"/>
+    </dgm:scene3d>
+    <dgm:sp3d/>
+    <dgm:txPr/>
+    <dgm:style>
+      <a:lnRef idx="2">
+        <a:scrgbClr r="0" g="0" b="0"/>
+      </a:lnRef>
+      <a:fillRef idx="1">
+        <a:scrgbClr r="0" g="0" b="0"/>
+      </a:fillRef>
+      <a:effectRef idx="0">
+        <a:scrgbClr r="0" g="0" b="0"/>
+      </a:effectRef>
+      <a:fontRef idx="minor"/>
+    </dgm:style>
+  </dgm:styleLbl>
+  <dgm:styleLbl name="solidFgAcc1">
+    <dgm:scene3d>
+      <a:camera prst="orthographicFront"/>
+      <a:lightRig rig="threePt" dir="t"/>
+    </dgm:scene3d>
+    <dgm:sp3d/>
+    <dgm:txPr/>
+    <dgm:style>
+      <a:lnRef idx="2">
+        <a:scrgbClr r="0" g="0" b="0"/>
+      </a:lnRef>
+      <a:fillRef idx="1">
+        <a:scrgbClr r="0" g="0" b="0"/>
+      </a:fillRef>
+      <a:effectRef idx="0">
+        <a:scrgbClr r="0" g="0" b="0"/>
+      </a:effectRef>
+      <a:fontRef idx="minor"/>
+    </dgm:style>
+  </dgm:styleLbl>
+  <dgm:styleLbl name="solidAlignAcc1">
+    <dgm:scene3d>
+      <a:camera prst="orthographicFront"/>
+      <a:lightRig rig="threePt" dir="t"/>
+    </dgm:scene3d>
+    <dgm:sp3d/>
+    <dgm:txPr/>
+    <dgm:style>
+      <a:lnRef idx="2">
+        <a:scrgbClr r="0" g="0" b="0"/>
+      </a:lnRef>
+      <a:fillRef idx="1">
+        <a:scrgbClr r="0" g="0" b="0"/>
+      </a:fillRef>
+      <a:effectRef idx="0">
+        <a:scrgbClr r="0" g="0" b="0"/>
+      </a:effectRef>
+      <a:fontRef idx="minor"/>
+    </dgm:style>
+  </dgm:styleLbl>
+  <dgm:styleLbl name="solidBgAcc1">
+    <dgm:scene3d>
+      <a:camera prst="orthographicFront"/>
+      <a:lightRig rig="threePt" dir="t"/>
+    </dgm:scene3d>
+    <dgm:sp3d/>
+    <dgm:txPr/>
+    <dgm:style>
+      <a:lnRef idx="2">
+        <a:scrgbClr r="0" g="0" b="0"/>
+      </a:lnRef>
+      <a:fillRef idx="1">
+        <a:scrgbClr r="0" g="0" b="0"/>
+      </a:fillRef>
+      <a:effectRef idx="0">
+        <a:scrgbClr r="0" g="0" b="0"/>
+      </a:effectRef>
+      <a:fontRef idx="minor"/>
+    </dgm:style>
+  </dgm:styleLbl>
+  <dgm:styleLbl name="fgAccFollowNode1">
+    <dgm:scene3d>
+      <a:camera prst="orthographicFront"/>
+      <a:lightRig rig="threePt" dir="t"/>
+    </dgm:scene3d>
+    <dgm:sp3d/>
+    <dgm:txPr/>
+    <dgm:style>
+      <a:lnRef idx="2">
+        <a:scrgbClr r="0" g="0" b="0"/>
+      </a:lnRef>
+      <a:fillRef idx="1">
+        <a:scrgbClr r="0" g="0" b="0"/>
+      </a:fillRef>
+      <a:effectRef idx="0">
+        <a:scrgbClr r="0" g="0" b="0"/>
+      </a:effectRef>
+      <a:fontRef idx="minor"/>
+    </dgm:style>
+  </dgm:styleLbl>
+  <dgm:styleLbl name="alignAccFollowNode1">
+    <dgm:scene3d>
+      <a:camera prst="orthographicFront"/>
+      <a:lightRig rig="threePt" dir="t"/>
+    </dgm:scene3d>
+    <dgm:sp3d/>
+    <dgm:txPr/>
+    <dgm:style>
+      <a:lnRef idx="2">
+        <a:scrgbClr r="0" g="0" b="0"/>
+      </a:lnRef>
+      <a:fillRef idx="1">
+        <a:scrgbClr r="0" g="0" b="0"/>
+      </a:fillRef>
+      <a:effectRef idx="0">
+        <a:scrgbClr r="0" g="0" b="0"/>
+      </a:effectRef>
+      <a:fontRef idx="minor"/>
+    </dgm:style>
+  </dgm:styleLbl>
+  <dgm:styleLbl name="bgAccFollowNode1">
+    <dgm:scene3d>
+      <a:camera prst="orthographicFront"/>
+      <a:lightRig rig="threePt" dir="t"/>
+    </dgm:scene3d>
+    <dgm:sp3d/>
+    <dgm:txPr/>
+    <dgm:style>
+      <a:lnRef idx="2">
+        <a:scrgbClr r="0" g="0" b="0"/>
+      </a:lnRef>
+      <a:fillRef idx="1">
+        <a:scrgbClr r="0" g="0" b="0"/>
+      </a:fillRef>
+      <a:effectRef idx="0">
+        <a:scrgbClr r="0" g="0" b="0"/>
+      </a:effectRef>
+      <a:fontRef idx="minor"/>
+    </dgm:style>
+  </dgm:styleLbl>
+  <dgm:styleLbl name="fgAcc0">
+    <dgm:scene3d>
+      <a:camera prst="orthographicFront"/>
+      <a:lightRig rig="threePt" dir="t"/>
+    </dgm:scene3d>
+    <dgm:sp3d/>
+    <dgm:txPr/>
+    <dgm:style>
+      <a:lnRef idx="2">
+        <a:scrgbClr r="0" g="0" b="0"/>
+      </a:lnRef>
+      <a:fillRef idx="1">
+        <a:scrgbClr r="0" g="0" b="0"/>
+      </a:fillRef>
+      <a:effectRef idx="0">
+        <a:scrgbClr r="0" g="0" b="0"/>
+      </a:effectRef>
+      <a:fontRef idx="minor"/>
+    </dgm:style>
+  </dgm:styleLbl>
+  <dgm:styleLbl name="fgAcc2">
+    <dgm:scene3d>
+      <a:camera prst="orthographicFront"/>
+      <a:lightRig rig="threePt" dir="t"/>
+    </dgm:scene3d>
+    <dgm:sp3d/>
+    <dgm:txPr/>
+    <dgm:style>
+      <a:lnRef idx="2">
+        <a:scrgbClr r="0" g="0" b="0"/>
+      </a:lnRef>
+      <a:fillRef idx="1">
+        <a:scrgbClr r="0" g="0" b="0"/>
+      </a:fillRef>
+      <a:effectRef idx="0">
+        <a:scrgbClr r="0" g="0" b="0"/>
+      </a:effectRef>
+      <a:fontRef idx="minor"/>
+    </dgm:style>
+  </dgm:styleLbl>
+  <dgm:styleLbl name="fgAcc3">
+    <dgm:scene3d>
+      <a:camera prst="orthographicFront"/>
+      <a:lightRig rig="threePt" dir="t"/>
+    </dgm:scene3d>
+    <dgm:sp3d/>
+    <dgm:txPr/>
+    <dgm:style>
+      <a:lnRef idx="2">
+        <a:scrgbClr r="0" g="0" b="0"/>
+      </a:lnRef>
+      <a:fillRef idx="1">
+        <a:scrgbClr r="0" g="0" b="0"/>
+      </a:fillRef>
+      <a:effectRef idx="0">
+        <a:scrgbClr r="0" g="0" b="0"/>
+      </a:effectRef>
+      <a:fontRef idx="minor"/>
+    </dgm:style>
+  </dgm:styleLbl>
+  <dgm:styleLbl name="fgAcc4">
+    <dgm:scene3d>
+      <a:camera prst="orthographicFront"/>
+      <a:lightRig rig="threePt" dir="t"/>
+    </dgm:scene3d>
+    <dgm:sp3d/>
+    <dgm:txPr/>
+    <dgm:style>
+      <a:lnRef idx="2">
+        <a:scrgbClr r="0" g="0" b="0"/>
+      </a:lnRef>
+      <a:fillRef idx="1">
+        <a:scrgbClr r="0" g="0" b="0"/>
+      </a:fillRef>
+      <a:effectRef idx="0">
+        <a:scrgbClr r="0" g="0" b="0"/>
+      </a:effectRef>
+      <a:fontRef idx="minor"/>
+    </dgm:style>
+  </dgm:styleLbl>
+  <dgm:styleLbl name="bgShp">
+    <dgm:scene3d>
+      <a:camera prst="orthographicFront"/>
+      <a:lightRig rig="threePt" dir="t"/>
+    </dgm:scene3d>
+    <dgm:sp3d/>
+    <dgm:txPr/>
+    <dgm:style>
+      <a:lnRef idx="0">
+        <a:scrgbClr r="0" g="0" b="0"/>
+      </a:lnRef>
+      <a:fillRef idx="1">
+        <a:scrgbClr r="0" g="0" b="0"/>
+      </a:fillRef>
+      <a:effectRef idx="0">
+        <a:scrgbClr r="0" g="0" b="0"/>
+      </a:effectRef>
+      <a:fontRef idx="minor"/>
+    </dgm:style>
+  </dgm:styleLbl>
+  <dgm:styleLbl name="dkBgShp">
+    <dgm:scene3d>
+      <a:camera prst="orthographicFront"/>
+      <a:lightRig rig="threePt" dir="t"/>
+    </dgm:scene3d>
+    <dgm:sp3d/>
+    <dgm:txPr/>
+    <dgm:style>
+      <a:lnRef idx="0">
+        <a:scrgbClr r="0" g="0" b="0"/>
+      </a:lnRef>
+      <a:fillRef idx="1">
+        <a:scrgbClr r="0" g="0" b="0"/>
+      </a:fillRef>
+      <a:effectRef idx="0">
+        <a:scrgbClr r="0" g="0" b="0"/>
+      </a:effectRef>
+      <a:fontRef idx="minor"/>
+    </dgm:style>
+  </dgm:styleLbl>
+  <dgm:styleLbl name="trBgShp">
+    <dgm:scene3d>
+      <a:camera prst="orthographicFront"/>
+      <a:lightRig rig="threePt" dir="t"/>
+    </dgm:scene3d>
+    <dgm:sp3d/>
+    <dgm:txPr/>
+    <dgm:style>
+      <a:lnRef idx="0">
+        <a:scrgbClr r="0" g="0" b="0"/>
+      </a:lnRef>
+      <a:fillRef idx="1">
+        <a:scrgbClr r="0" g="0" b="0"/>
+      </a:fillRef>
+      <a:effectRef idx="0">
+        <a:scrgbClr r="0" g="0" b="0"/>
+      </a:effectRef>
+      <a:fontRef idx="minor"/>
+    </dgm:style>
+  </dgm:styleLbl>
+  <dgm:styleLbl name="fgShp">
+    <dgm:scene3d>
+      <a:camera prst="orthographicFront"/>
+      <a:lightRig rig="threePt" dir="t"/>
+    </dgm:scene3d>
+    <dgm:sp3d/>
+    <dgm:txPr/>
+    <dgm:style>
+      <a:lnRef idx="2">
+        <a:scrgbClr r="0" g="0" b="0"/>
+      </a:lnRef>
+      <a:fillRef idx="1">
+        <a:scrgbClr r="0" g="0" b="0"/>
+      </a:fillRef>
+      <a:effectRef idx="0">
+        <a:scrgbClr r="0" g="0" b="0"/>
+      </a:effectRef>
+      <a:fontRef idx="minor"/>
+    </dgm:style>
+  </dgm:styleLbl>
+  <dgm:styleLbl name="revTx">
+    <dgm:scene3d>
+      <a:camera prst="orthographicFront"/>
+      <a:lightRig rig="threePt" dir="t"/>
+    </dgm:scene3d>
+    <dgm:sp3d/>
+    <dgm:txPr/>
+    <dgm:style>
+      <a:lnRef idx="0">
+        <a:scrgbClr r="0" g="0" b="0"/>
+      </a:lnRef>
+      <a:fillRef idx="0">
+        <a:scrgbClr r="0" g="0" b="0"/>
+      </a:fillRef>
+      <a:effectRef idx="0">
+        <a:scrgbClr r="0" g="0" b="0"/>
+      </a:effectRef>
+      <a:fontRef idx="minor"/>
+    </dgm:style>
+  </dgm:styleLbl>
+</dgm:styleDef>
+</file>
+
 <file path=ppt/handoutMasters/handoutMaster1.xml><?xml version="1.0" encoding="utf-8"?>
 <p:handoutMaster xmlns:a="http://schemas.openxmlformats.org/drawingml/2006/main" xmlns:r="http://schemas.openxmlformats.org/officeDocument/2006/relationships" xmlns:p="http://schemas.openxmlformats.org/presentationml/2006/main">
   <p:cSld>
@@ -238,7 +3030,7 @@
           <a:p>
             <a:fld id="{C17F2C1D-F243-42AB-ADF2-E7CB4E04900E}" type="datetimeFigureOut">
               <a:rPr lang="en-US" smtClean="0"/>
-              <a:t>12/1/2022</a:t>
+              <a:t>12/2/2022</a:t>
             </a:fld>
             <a:endParaRPr lang="en-US"/>
           </a:p>
@@ -415,7 +3207,7 @@
           <a:p>
             <a:fld id="{020CE34E-5667-4A32-A6BA-10C7A552BC63}" type="datetimeFigureOut">
               <a:rPr lang="en-US" smtClean="0"/>
-              <a:t>12/1/2022</a:t>
+              <a:t>12/2/2022</a:t>
             </a:fld>
             <a:endParaRPr lang="en-US"/>
           </a:p>
@@ -16981,6 +19773,14 @@
 <file path=ppt/slides/slide8.xml><?xml version="1.0" encoding="utf-8"?>
 <p:sld xmlns:a="http://schemas.openxmlformats.org/drawingml/2006/main" xmlns:r="http://schemas.openxmlformats.org/officeDocument/2006/relationships" xmlns:p="http://schemas.openxmlformats.org/presentationml/2006/main">
   <p:cSld>
+    <p:bg>
+      <p:bgPr>
+        <a:solidFill>
+          <a:schemeClr val="bg2"/>
+        </a:solidFill>
+        <a:effectLst/>
+      </p:bgPr>
+    </p:bg>
     <p:spTree>
       <p:nvGrpSpPr>
         <p:cNvPr id="1" name=""/>
@@ -16995,6 +19795,570 @@
           <a:chExt cx="0" cy="0"/>
         </a:xfrm>
       </p:grpSpPr>
+      <p:grpSp>
+        <p:nvGrpSpPr>
+          <p:cNvPr id="39" name="Group 38">
+            <a:extLst>
+              <a:ext uri="{FF2B5EF4-FFF2-40B4-BE49-F238E27FC236}">
+                <a16:creationId xmlns:a16="http://schemas.microsoft.com/office/drawing/2014/main" id="{3BDBC526-6DCD-4FF6-8395-D8C22E46E527}"/>
+              </a:ext>
+              <a:ext uri="{C183D7F6-B498-43B3-948B-1728B52AA6E4}">
+                <adec:decorative xmlns:adec="http://schemas.microsoft.com/office/drawing/2017/decorative" val="1"/>
+              </a:ext>
+            </a:extLst>
+          </p:cNvPr>
+          <p:cNvGrpSpPr>
+            <a:grpSpLocks noGrp="1" noUngrp="1" noRot="1" noChangeAspect="1" noMove="1" noResize="1"/>
+          </p:cNvGrpSpPr>
+          <p:nvPr>
+            <p:extLst>
+              <p:ext uri="{386F3935-93C4-4BCD-93E2-E3B085C9AB24}">
+                <p16:designElem xmlns:p16="http://schemas.microsoft.com/office/powerpoint/2015/main" val="1"/>
+              </p:ext>
+            </p:extLst>
+          </p:nvPr>
+        </p:nvGrpSpPr>
+        <p:grpSpPr>
+          <a:xfrm>
+            <a:off x="613998" y="5334748"/>
+            <a:ext cx="678135" cy="990000"/>
+            <a:chOff x="10490969" y="1448827"/>
+            <a:chExt cx="678135" cy="990000"/>
+          </a:xfrm>
+        </p:grpSpPr>
+        <p:sp>
+          <p:nvSpPr>
+            <p:cNvPr id="40" name="Freeform: Shape 39">
+              <a:extLst>
+                <a:ext uri="{FF2B5EF4-FFF2-40B4-BE49-F238E27FC236}">
+                  <a16:creationId xmlns:a16="http://schemas.microsoft.com/office/drawing/2014/main" id="{02ECB475-568C-47AC-B16D-2E202DEB2DE0}"/>
+                </a:ext>
+                <a:ext uri="{C183D7F6-B498-43B3-948B-1728B52AA6E4}">
+                  <adec:decorative xmlns:adec="http://schemas.microsoft.com/office/drawing/2017/decorative" val="1"/>
+                </a:ext>
+              </a:extLst>
+            </p:cNvPr>
+            <p:cNvSpPr>
+              <a:spLocks noChangeAspect="1"/>
+            </p:cNvSpPr>
+            <p:nvPr>
+              <p:extLst>
+                <p:ext uri="{386F3935-93C4-4BCD-93E2-E3B085C9AB24}">
+                  <p16:designElem xmlns:p16="http://schemas.microsoft.com/office/powerpoint/2015/main" val="1"/>
+                </p:ext>
+              </p:extLst>
+            </p:nvPr>
+          </p:nvSpPr>
+          <p:spPr>
+            <a:xfrm rot="2700000" flipH="1" flipV="1">
+              <a:off x="10268976" y="1743588"/>
+              <a:ext cx="926985" cy="463493"/>
+            </a:xfrm>
+            <a:custGeom>
+              <a:avLst/>
+              <a:gdLst>
+                <a:gd name="connsiteX0" fmla="*/ 1329373 w 2658746"/>
+                <a:gd name="connsiteY0" fmla="*/ 0 h 1329373"/>
+                <a:gd name="connsiteX1" fmla="*/ 2658746 w 2658746"/>
+                <a:gd name="connsiteY1" fmla="*/ 1329373 h 1329373"/>
+                <a:gd name="connsiteX2" fmla="*/ 1994059 w 2658746"/>
+                <a:gd name="connsiteY2" fmla="*/ 1329373 h 1329373"/>
+                <a:gd name="connsiteX3" fmla="*/ 1329373 w 2658746"/>
+                <a:gd name="connsiteY3" fmla="*/ 664687 h 1329373"/>
+                <a:gd name="connsiteX4" fmla="*/ 664687 w 2658746"/>
+                <a:gd name="connsiteY4" fmla="*/ 1329373 h 1329373"/>
+                <a:gd name="connsiteX5" fmla="*/ 0 w 2658746"/>
+                <a:gd name="connsiteY5" fmla="*/ 1329373 h 1329373"/>
+                <a:gd name="connsiteX6" fmla="*/ 1329373 w 2658746"/>
+                <a:gd name="connsiteY6" fmla="*/ 0 h 1329373"/>
+              </a:gdLst>
+              <a:ahLst/>
+              <a:cxnLst>
+                <a:cxn ang="0">
+                  <a:pos x="connsiteX0" y="connsiteY0"/>
+                </a:cxn>
+                <a:cxn ang="0">
+                  <a:pos x="connsiteX1" y="connsiteY1"/>
+                </a:cxn>
+                <a:cxn ang="0">
+                  <a:pos x="connsiteX2" y="connsiteY2"/>
+                </a:cxn>
+                <a:cxn ang="0">
+                  <a:pos x="connsiteX3" y="connsiteY3"/>
+                </a:cxn>
+                <a:cxn ang="0">
+                  <a:pos x="connsiteX4" y="connsiteY4"/>
+                </a:cxn>
+                <a:cxn ang="0">
+                  <a:pos x="connsiteX5" y="connsiteY5"/>
+                </a:cxn>
+                <a:cxn ang="0">
+                  <a:pos x="connsiteX6" y="connsiteY6"/>
+                </a:cxn>
+              </a:cxnLst>
+              <a:rect l="l" t="t" r="r" b="b"/>
+              <a:pathLst>
+                <a:path w="2658746" h="1329373">
+                  <a:moveTo>
+                    <a:pt x="1329373" y="0"/>
+                  </a:moveTo>
+                  <a:cubicBezTo>
+                    <a:pt x="2063565" y="0"/>
+                    <a:pt x="2658746" y="595181"/>
+                    <a:pt x="2658746" y="1329373"/>
+                  </a:cubicBezTo>
+                  <a:lnTo>
+                    <a:pt x="1994059" y="1329373"/>
+                  </a:lnTo>
+                  <a:cubicBezTo>
+                    <a:pt x="1994059" y="962277"/>
+                    <a:pt x="1696469" y="664687"/>
+                    <a:pt x="1329373" y="664687"/>
+                  </a:cubicBezTo>
+                  <a:cubicBezTo>
+                    <a:pt x="962277" y="664687"/>
+                    <a:pt x="664687" y="962277"/>
+                    <a:pt x="664687" y="1329373"/>
+                  </a:cubicBezTo>
+                  <a:lnTo>
+                    <a:pt x="0" y="1329373"/>
+                  </a:lnTo>
+                  <a:cubicBezTo>
+                    <a:pt x="0" y="595181"/>
+                    <a:pt x="595181" y="0"/>
+                    <a:pt x="1329373" y="0"/>
+                  </a:cubicBezTo>
+                  <a:close/>
+                </a:path>
+              </a:pathLst>
+            </a:custGeom>
+            <a:solidFill>
+              <a:schemeClr val="bg2"/>
+            </a:solidFill>
+            <a:ln>
+              <a:noFill/>
+            </a:ln>
+            <a:effectLst>
+              <a:innerShdw blurRad="127000" dist="50800" dir="13500000">
+                <a:schemeClr val="accent1">
+                  <a:lumMod val="40000"/>
+                  <a:lumOff val="60000"/>
+                  <a:alpha val="20000"/>
+                </a:schemeClr>
+              </a:innerShdw>
+            </a:effectLst>
+          </p:spPr>
+          <p:style>
+            <a:lnRef idx="2">
+              <a:schemeClr val="accent1">
+                <a:shade val="50000"/>
+              </a:schemeClr>
+            </a:lnRef>
+            <a:fillRef idx="1">
+              <a:schemeClr val="accent1"/>
+            </a:fillRef>
+            <a:effectRef idx="0">
+              <a:schemeClr val="accent1"/>
+            </a:effectRef>
+            <a:fontRef idx="minor">
+              <a:schemeClr val="lt1"/>
+            </a:fontRef>
+          </p:style>
+          <p:txBody>
+            <a:bodyPr rtlCol="0" anchor="ctr"/>
+            <a:lstStyle/>
+            <a:p>
+              <a:pPr algn="ctr"/>
+              <a:endParaRPr lang="en-US" dirty="0">
+                <a:solidFill>
+                  <a:schemeClr val="tx1"/>
+                </a:solidFill>
+              </a:endParaRPr>
+            </a:p>
+          </p:txBody>
+        </p:sp>
+        <p:sp>
+          <p:nvSpPr>
+            <p:cNvPr id="41" name="Oval 40">
+              <a:extLst>
+                <a:ext uri="{FF2B5EF4-FFF2-40B4-BE49-F238E27FC236}">
+                  <a16:creationId xmlns:a16="http://schemas.microsoft.com/office/drawing/2014/main" id="{080D8764-525A-441E-B58F-068E82F09714}"/>
+                </a:ext>
+                <a:ext uri="{C183D7F6-B498-43B3-948B-1728B52AA6E4}">
+                  <adec:decorative xmlns:adec="http://schemas.microsoft.com/office/drawing/2017/decorative" val="1"/>
+                </a:ext>
+              </a:extLst>
+            </p:cNvPr>
+            <p:cNvSpPr/>
+            <p:nvPr>
+              <p:extLst>
+                <p:ext uri="{386F3935-93C4-4BCD-93E2-E3B085C9AB24}">
+                  <p16:designElem xmlns:p16="http://schemas.microsoft.com/office/powerpoint/2015/main" val="1"/>
+                </p:ext>
+              </p:extLst>
+            </p:nvPr>
+          </p:nvSpPr>
+          <p:spPr>
+            <a:xfrm rot="8100000" flipH="1" flipV="1">
+              <a:off x="11115555" y="1939340"/>
+              <a:ext cx="53549" cy="233295"/>
+            </a:xfrm>
+            <a:prstGeom prst="ellipse">
+              <a:avLst/>
+            </a:prstGeom>
+            <a:solidFill>
+              <a:schemeClr val="bg2">
+                <a:lumMod val="90000"/>
+                <a:lumOff val="10000"/>
+              </a:schemeClr>
+            </a:solidFill>
+            <a:ln>
+              <a:noFill/>
+            </a:ln>
+            <a:effectLst>
+              <a:innerShdw blurRad="63500" dist="2540000">
+                <a:schemeClr val="accent1">
+                  <a:lumMod val="60000"/>
+                  <a:lumOff val="40000"/>
+                  <a:alpha val="0"/>
+                </a:schemeClr>
+              </a:innerShdw>
+            </a:effectLst>
+          </p:spPr>
+          <p:style>
+            <a:lnRef idx="2">
+              <a:schemeClr val="accent1">
+                <a:shade val="50000"/>
+              </a:schemeClr>
+            </a:lnRef>
+            <a:fillRef idx="1">
+              <a:schemeClr val="accent1"/>
+            </a:fillRef>
+            <a:effectRef idx="0">
+              <a:schemeClr val="accent1"/>
+            </a:effectRef>
+            <a:fontRef idx="minor">
+              <a:schemeClr val="lt1"/>
+            </a:fontRef>
+          </p:style>
+          <p:txBody>
+            <a:bodyPr rot="0" spcFirstLastPara="0" vertOverflow="overflow" horzOverflow="overflow" vert="horz" wrap="square" lIns="91440" tIns="45720" rIns="91440" bIns="45720" numCol="1" spcCol="0" rtlCol="0" fromWordArt="0" anchor="ctr" anchorCtr="0" forceAA="0" compatLnSpc="1">
+              <a:prstTxWarp prst="textNoShape">
+                <a:avLst/>
+              </a:prstTxWarp>
+              <a:noAutofit/>
+            </a:bodyPr>
+            <a:lstStyle/>
+            <a:p>
+              <a:pPr algn="ctr"/>
+              <a:endParaRPr lang="en-US"/>
+            </a:p>
+          </p:txBody>
+        </p:sp>
+        <p:sp>
+          <p:nvSpPr>
+            <p:cNvPr id="42" name="Oval 41">
+              <a:extLst>
+                <a:ext uri="{FF2B5EF4-FFF2-40B4-BE49-F238E27FC236}">
+                  <a16:creationId xmlns:a16="http://schemas.microsoft.com/office/drawing/2014/main" id="{11196109-6F2B-4738-B2FC-2CCC753AABD4}"/>
+                </a:ext>
+                <a:ext uri="{C183D7F6-B498-43B3-948B-1728B52AA6E4}">
+                  <adec:decorative xmlns:adec="http://schemas.microsoft.com/office/drawing/2017/decorative" val="1"/>
+                </a:ext>
+              </a:extLst>
+            </p:cNvPr>
+            <p:cNvSpPr/>
+            <p:nvPr>
+              <p:extLst>
+                <p:ext uri="{386F3935-93C4-4BCD-93E2-E3B085C9AB24}">
+                  <p16:designElem xmlns:p16="http://schemas.microsoft.com/office/powerpoint/2015/main" val="1"/>
+                </p:ext>
+              </p:extLst>
+            </p:nvPr>
+          </p:nvSpPr>
+          <p:spPr>
+            <a:xfrm rot="8100000" flipH="1" flipV="1">
+              <a:off x="10625042" y="1448827"/>
+              <a:ext cx="53549" cy="233295"/>
+            </a:xfrm>
+            <a:prstGeom prst="ellipse">
+              <a:avLst/>
+            </a:prstGeom>
+            <a:solidFill>
+              <a:schemeClr val="bg2">
+                <a:lumMod val="90000"/>
+                <a:lumOff val="10000"/>
+              </a:schemeClr>
+            </a:solidFill>
+            <a:ln>
+              <a:noFill/>
+            </a:ln>
+            <a:effectLst>
+              <a:innerShdw blurRad="63500" dist="2540000">
+                <a:schemeClr val="accent1">
+                  <a:lumMod val="60000"/>
+                  <a:lumOff val="40000"/>
+                  <a:alpha val="0"/>
+                </a:schemeClr>
+              </a:innerShdw>
+            </a:effectLst>
+          </p:spPr>
+          <p:style>
+            <a:lnRef idx="2">
+              <a:schemeClr val="accent1">
+                <a:shade val="50000"/>
+              </a:schemeClr>
+            </a:lnRef>
+            <a:fillRef idx="1">
+              <a:schemeClr val="accent1"/>
+            </a:fillRef>
+            <a:effectRef idx="0">
+              <a:schemeClr val="accent1"/>
+            </a:effectRef>
+            <a:fontRef idx="minor">
+              <a:schemeClr val="lt1"/>
+            </a:fontRef>
+          </p:style>
+          <p:txBody>
+            <a:bodyPr rot="0" spcFirstLastPara="0" vertOverflow="overflow" horzOverflow="overflow" vert="horz" wrap="square" lIns="91440" tIns="45720" rIns="91440" bIns="45720" numCol="1" spcCol="0" rtlCol="0" fromWordArt="0" anchor="ctr" anchorCtr="0" forceAA="0" compatLnSpc="1">
+              <a:prstTxWarp prst="textNoShape">
+                <a:avLst/>
+              </a:prstTxWarp>
+              <a:noAutofit/>
+            </a:bodyPr>
+            <a:lstStyle/>
+            <a:p>
+              <a:pPr algn="ctr"/>
+              <a:endParaRPr lang="en-US"/>
+            </a:p>
+          </p:txBody>
+        </p:sp>
+        <p:sp>
+          <p:nvSpPr>
+            <p:cNvPr id="43" name="Freeform: Shape 42">
+              <a:extLst>
+                <a:ext uri="{FF2B5EF4-FFF2-40B4-BE49-F238E27FC236}">
+                  <a16:creationId xmlns:a16="http://schemas.microsoft.com/office/drawing/2014/main" id="{F7E468C2-69B8-470B-85E3-801A3CB1D7E2}"/>
+                </a:ext>
+                <a:ext uri="{C183D7F6-B498-43B3-948B-1728B52AA6E4}">
+                  <adec:decorative xmlns:adec="http://schemas.microsoft.com/office/drawing/2017/decorative" val="1"/>
+                </a:ext>
+              </a:extLst>
+            </p:cNvPr>
+            <p:cNvSpPr>
+              <a:spLocks noChangeAspect="1"/>
+            </p:cNvSpPr>
+            <p:nvPr>
+              <p:extLst>
+                <p:ext uri="{386F3935-93C4-4BCD-93E2-E3B085C9AB24}">
+                  <p16:designElem xmlns:p16="http://schemas.microsoft.com/office/powerpoint/2015/main" val="1"/>
+                </p:ext>
+              </p:extLst>
+            </p:nvPr>
+          </p:nvSpPr>
+          <p:spPr>
+            <a:xfrm rot="2700000" flipH="1" flipV="1">
+              <a:off x="10292519" y="1686748"/>
+              <a:ext cx="926985" cy="530086"/>
+            </a:xfrm>
+            <a:custGeom>
+              <a:avLst/>
+              <a:gdLst>
+                <a:gd name="connsiteX0" fmla="*/ 1329373 w 2658746"/>
+                <a:gd name="connsiteY0" fmla="*/ 0 h 1329373"/>
+                <a:gd name="connsiteX1" fmla="*/ 2658746 w 2658746"/>
+                <a:gd name="connsiteY1" fmla="*/ 1329373 h 1329373"/>
+                <a:gd name="connsiteX2" fmla="*/ 1994059 w 2658746"/>
+                <a:gd name="connsiteY2" fmla="*/ 1329373 h 1329373"/>
+                <a:gd name="connsiteX3" fmla="*/ 1329373 w 2658746"/>
+                <a:gd name="connsiteY3" fmla="*/ 664687 h 1329373"/>
+                <a:gd name="connsiteX4" fmla="*/ 664687 w 2658746"/>
+                <a:gd name="connsiteY4" fmla="*/ 1329373 h 1329373"/>
+                <a:gd name="connsiteX5" fmla="*/ 0 w 2658746"/>
+                <a:gd name="connsiteY5" fmla="*/ 1329373 h 1329373"/>
+                <a:gd name="connsiteX6" fmla="*/ 1329373 w 2658746"/>
+                <a:gd name="connsiteY6" fmla="*/ 0 h 1329373"/>
+              </a:gdLst>
+              <a:ahLst/>
+              <a:cxnLst>
+                <a:cxn ang="0">
+                  <a:pos x="connsiteX0" y="connsiteY0"/>
+                </a:cxn>
+                <a:cxn ang="0">
+                  <a:pos x="connsiteX1" y="connsiteY1"/>
+                </a:cxn>
+                <a:cxn ang="0">
+                  <a:pos x="connsiteX2" y="connsiteY2"/>
+                </a:cxn>
+                <a:cxn ang="0">
+                  <a:pos x="connsiteX3" y="connsiteY3"/>
+                </a:cxn>
+                <a:cxn ang="0">
+                  <a:pos x="connsiteX4" y="connsiteY4"/>
+                </a:cxn>
+                <a:cxn ang="0">
+                  <a:pos x="connsiteX5" y="connsiteY5"/>
+                </a:cxn>
+                <a:cxn ang="0">
+                  <a:pos x="connsiteX6" y="connsiteY6"/>
+                </a:cxn>
+              </a:cxnLst>
+              <a:rect l="l" t="t" r="r" b="b"/>
+              <a:pathLst>
+                <a:path w="2658746" h="1329373">
+                  <a:moveTo>
+                    <a:pt x="1329373" y="0"/>
+                  </a:moveTo>
+                  <a:cubicBezTo>
+                    <a:pt x="2063565" y="0"/>
+                    <a:pt x="2658746" y="595181"/>
+                    <a:pt x="2658746" y="1329373"/>
+                  </a:cubicBezTo>
+                  <a:lnTo>
+                    <a:pt x="1994059" y="1329373"/>
+                  </a:lnTo>
+                  <a:cubicBezTo>
+                    <a:pt x="1994059" y="962277"/>
+                    <a:pt x="1696469" y="664687"/>
+                    <a:pt x="1329373" y="664687"/>
+                  </a:cubicBezTo>
+                  <a:cubicBezTo>
+                    <a:pt x="962277" y="664687"/>
+                    <a:pt x="664687" y="962277"/>
+                    <a:pt x="664687" y="1329373"/>
+                  </a:cubicBezTo>
+                  <a:lnTo>
+                    <a:pt x="0" y="1329373"/>
+                  </a:lnTo>
+                  <a:cubicBezTo>
+                    <a:pt x="0" y="595181"/>
+                    <a:pt x="595181" y="0"/>
+                    <a:pt x="1329373" y="0"/>
+                  </a:cubicBezTo>
+                  <a:close/>
+                </a:path>
+              </a:pathLst>
+            </a:custGeom>
+            <a:solidFill>
+              <a:schemeClr val="bg2">
+                <a:lumMod val="50000"/>
+                <a:lumOff val="50000"/>
+                <a:alpha val="20000"/>
+              </a:schemeClr>
+            </a:solidFill>
+            <a:ln>
+              <a:noFill/>
+            </a:ln>
+            <a:effectLst>
+              <a:softEdge rad="101600"/>
+            </a:effectLst>
+          </p:spPr>
+          <p:style>
+            <a:lnRef idx="2">
+              <a:schemeClr val="accent1">
+                <a:shade val="50000"/>
+              </a:schemeClr>
+            </a:lnRef>
+            <a:fillRef idx="1">
+              <a:schemeClr val="accent1"/>
+            </a:fillRef>
+            <a:effectRef idx="0">
+              <a:schemeClr val="accent1"/>
+            </a:effectRef>
+            <a:fontRef idx="minor">
+              <a:schemeClr val="lt1"/>
+            </a:fontRef>
+          </p:style>
+          <p:txBody>
+            <a:bodyPr rtlCol="0" anchor="ctr"/>
+            <a:lstStyle/>
+            <a:p>
+              <a:pPr algn="ctr"/>
+              <a:endParaRPr lang="en-US" dirty="0">
+                <a:solidFill>
+                  <a:schemeClr val="tx1"/>
+                </a:solidFill>
+              </a:endParaRPr>
+            </a:p>
+          </p:txBody>
+        </p:sp>
+      </p:grpSp>
+      <p:sp useBgFill="1">
+        <p:nvSpPr>
+          <p:cNvPr id="45" name="Rectangle 44">
+            <a:extLst>
+              <a:ext uri="{FF2B5EF4-FFF2-40B4-BE49-F238E27FC236}">
+                <a16:creationId xmlns:a16="http://schemas.microsoft.com/office/drawing/2014/main" id="{60B7752B-728D-4CA3-8923-C4F7F77029E3}"/>
+              </a:ext>
+              <a:ext uri="{C183D7F6-B498-43B3-948B-1728B52AA6E4}">
+                <adec:decorative xmlns:adec="http://schemas.microsoft.com/office/drawing/2017/decorative" val="1"/>
+              </a:ext>
+            </a:extLst>
+          </p:cNvPr>
+          <p:cNvSpPr>
+            <a:spLocks noGrp="1" noRot="1" noChangeAspect="1" noMove="1" noResize="1" noEditPoints="1" noAdjustHandles="1" noChangeArrowheads="1" noChangeShapeType="1" noTextEdit="1"/>
+          </p:cNvSpPr>
+          <p:nvPr>
+            <p:extLst>
+              <p:ext uri="{386F3935-93C4-4BCD-93E2-E3B085C9AB24}">
+                <p16:designElem xmlns:p16="http://schemas.microsoft.com/office/powerpoint/2015/main" val="1"/>
+              </p:ext>
+            </p:extLst>
+          </p:nvPr>
+        </p:nvSpPr>
+        <p:spPr>
+          <a:xfrm>
+            <a:off x="0" y="0"/>
+            <a:ext cx="12192000" cy="6858000"/>
+          </a:xfrm>
+          <a:prstGeom prst="rect">
+            <a:avLst/>
+          </a:prstGeom>
+          <a:ln w="12700" cap="flat" cmpd="sng" algn="ctr">
+            <a:noFill/>
+            <a:prstDash val="solid"/>
+            <a:miter lim="800000"/>
+          </a:ln>
+          <a:effectLst/>
+          <a:extLst>
+            <a:ext uri="{91240B29-F687-4F45-9708-019B960494DF}">
+              <a14:hiddenLine xmlns:a14="http://schemas.microsoft.com/office/drawing/2010/main" w="12700" cap="flat" cmpd="sng" algn="ctr">
+                <a:solidFill>
+                  <a:schemeClr val="accent1">
+                    <a:shade val="50000"/>
+                  </a:schemeClr>
+                </a:solidFill>
+                <a:prstDash val="solid"/>
+                <a:miter lim="800000"/>
+              </a14:hiddenLine>
+            </a:ext>
+          </a:extLst>
+        </p:spPr>
+        <p:style>
+          <a:lnRef idx="2">
+            <a:schemeClr val="accent1">
+              <a:shade val="50000"/>
+            </a:schemeClr>
+          </a:lnRef>
+          <a:fillRef idx="1">
+            <a:schemeClr val="accent1"/>
+          </a:fillRef>
+          <a:effectRef idx="0">
+            <a:schemeClr val="accent1"/>
+          </a:effectRef>
+          <a:fontRef idx="minor">
+            <a:schemeClr val="lt1"/>
+          </a:fontRef>
+        </p:style>
+        <p:txBody>
+          <a:bodyPr rtlCol="0" anchor="ctr"/>
+          <a:lstStyle/>
+          <a:p>
+            <a:pPr algn="ctr"/>
+            <a:endParaRPr lang="en-US"/>
+          </a:p>
+        </p:txBody>
+      </p:sp>
       <p:sp>
         <p:nvSpPr>
           <p:cNvPr id="6" name="Title 5">
@@ -17013,418 +20377,93 @@
         </p:nvSpPr>
         <p:spPr>
           <a:xfrm>
-            <a:off x="548640" y="548640"/>
-            <a:ext cx="8281987" cy="1253041"/>
+            <a:off x="550863" y="550800"/>
+            <a:ext cx="7308850" cy="986400"/>
           </a:xfrm>
         </p:spPr>
         <p:txBody>
-          <a:bodyPr/>
+          <a:bodyPr vert="horz" wrap="square" lIns="0" tIns="0" rIns="0" bIns="0" rtlCol="0" anchor="ctr" anchorCtr="0">
+            <a:normAutofit/>
+          </a:bodyPr>
           <a:lstStyle/>
           <a:p>
+            <a:pPr>
+              <a:lnSpc>
+                <a:spcPct val="100000"/>
+              </a:lnSpc>
+            </a:pPr>
             <a:r>
               <a:rPr lang="en-US" dirty="0"/>
               <a:t>Too Few Samples</a:t>
             </a:r>
+            <a:endParaRPr lang="en-US"/>
           </a:p>
         </p:txBody>
       </p:sp>
-      <p:pic>
-        <p:nvPicPr>
-          <p:cNvPr id="17" name="Picture Placeholder 16" descr="A man smiling in the office">
-            <a:extLst>
-              <a:ext uri="{FF2B5EF4-FFF2-40B4-BE49-F238E27FC236}">
-                <a16:creationId xmlns:a16="http://schemas.microsoft.com/office/drawing/2014/main" id="{05ED5B1E-974F-476C-A3C9-572D3602E95E}"/>
-              </a:ext>
-            </a:extLst>
-          </p:cNvPr>
-          <p:cNvPicPr>
-            <a:picLocks noGrp="1" noChangeAspect="1"/>
-          </p:cNvPicPr>
-          <p:nvPr>
-            <p:ph type="pic" sz="quarter" idx="13"/>
-          </p:nvPr>
-        </p:nvPicPr>
-        <p:blipFill rotWithShape="1">
-          <a:blip r:embed="rId3" cstate="screen">
-            <a:extLst>
-              <a:ext uri="{28A0092B-C50C-407E-A947-70E740481C1C}">
-                <a14:useLocalDpi xmlns:a14="http://schemas.microsoft.com/office/drawing/2010/main" val="0"/>
-              </a:ext>
-            </a:extLst>
-          </a:blip>
-          <a:srcRect/>
-          <a:stretch/>
-        </p:blipFill>
-        <p:spPr>
-          <a:xfrm>
-            <a:off x="1078992" y="1990724"/>
-            <a:ext cx="1691640" cy="1435608"/>
-          </a:xfrm>
-        </p:spPr>
-      </p:pic>
-      <p:pic>
-        <p:nvPicPr>
-          <p:cNvPr id="36" name="Picture Placeholder 35" descr="A lady smiling in the office">
-            <a:extLst>
-              <a:ext uri="{FF2B5EF4-FFF2-40B4-BE49-F238E27FC236}">
-                <a16:creationId xmlns:a16="http://schemas.microsoft.com/office/drawing/2014/main" id="{F3CCCCDF-EA66-4F5E-98F3-A05239CBBAC4}"/>
-              </a:ext>
-            </a:extLst>
-          </p:cNvPr>
-          <p:cNvPicPr>
-            <a:picLocks noGrp="1" noChangeAspect="1"/>
-          </p:cNvPicPr>
-          <p:nvPr>
-            <p:ph type="pic" sz="quarter" idx="14"/>
-          </p:nvPr>
-        </p:nvPicPr>
-        <p:blipFill rotWithShape="1">
-          <a:blip r:embed="rId4" cstate="screen">
-            <a:extLst>
-              <a:ext uri="{28A0092B-C50C-407E-A947-70E740481C1C}">
-                <a14:useLocalDpi xmlns:a14="http://schemas.microsoft.com/office/drawing/2010/main" val="0"/>
-              </a:ext>
-            </a:extLst>
-          </a:blip>
-          <a:srcRect/>
-          <a:stretch/>
-        </p:blipFill>
-        <p:spPr>
-          <a:xfrm>
-            <a:off x="3838384" y="1990724"/>
-            <a:ext cx="1691640" cy="1435608"/>
-          </a:xfrm>
-        </p:spPr>
-      </p:pic>
-      <p:pic>
-        <p:nvPicPr>
-          <p:cNvPr id="38" name="Picture Placeholder 37" descr="A lady in the office smiling at the camera&#10;">
-            <a:extLst>
-              <a:ext uri="{FF2B5EF4-FFF2-40B4-BE49-F238E27FC236}">
-                <a16:creationId xmlns:a16="http://schemas.microsoft.com/office/drawing/2014/main" id="{8A6BB597-41F4-432E-8432-8F39511B2941}"/>
-              </a:ext>
-            </a:extLst>
-          </p:cNvPr>
-          <p:cNvPicPr>
-            <a:picLocks noGrp="1" noChangeAspect="1"/>
-          </p:cNvPicPr>
-          <p:nvPr>
-            <p:ph type="pic" sz="quarter" idx="15"/>
-          </p:nvPr>
-        </p:nvPicPr>
-        <p:blipFill rotWithShape="1">
-          <a:blip r:embed="rId5" cstate="screen">
-            <a:extLst>
-              <a:ext uri="{28A0092B-C50C-407E-A947-70E740481C1C}">
-                <a14:useLocalDpi xmlns:a14="http://schemas.microsoft.com/office/drawing/2010/main" val="0"/>
-              </a:ext>
-            </a:extLst>
-          </a:blip>
-          <a:srcRect/>
-          <a:stretch/>
-        </p:blipFill>
-        <p:spPr>
-          <a:xfrm>
-            <a:off x="6661976" y="1993392"/>
-            <a:ext cx="1691640" cy="1435608"/>
-          </a:xfrm>
-        </p:spPr>
-      </p:pic>
-      <p:pic>
-        <p:nvPicPr>
-          <p:cNvPr id="40" name="Picture Placeholder 39" descr="Smiling man with a beard">
-            <a:extLst>
-              <a:ext uri="{FF2B5EF4-FFF2-40B4-BE49-F238E27FC236}">
-                <a16:creationId xmlns:a16="http://schemas.microsoft.com/office/drawing/2014/main" id="{76B2FC80-9F3B-46D8-94D9-882D90A858F6}"/>
-              </a:ext>
-            </a:extLst>
-          </p:cNvPr>
-          <p:cNvPicPr>
-            <a:picLocks noGrp="1" noChangeAspect="1"/>
-          </p:cNvPicPr>
-          <p:nvPr>
-            <p:ph type="pic" sz="quarter" idx="16"/>
-          </p:nvPr>
-        </p:nvPicPr>
-        <p:blipFill rotWithShape="1">
-          <a:blip r:embed="rId6" cstate="screen">
-            <a:extLst>
-              <a:ext uri="{28A0092B-C50C-407E-A947-70E740481C1C}">
-                <a14:useLocalDpi xmlns:a14="http://schemas.microsoft.com/office/drawing/2010/main" val="0"/>
-              </a:ext>
-            </a:extLst>
-          </a:blip>
-          <a:srcRect/>
-          <a:stretch/>
-        </p:blipFill>
-        <p:spPr>
-          <a:xfrm>
-            <a:off x="9485568" y="1990724"/>
-            <a:ext cx="1691640" cy="1435608"/>
-          </a:xfrm>
-        </p:spPr>
-      </p:pic>
       <p:sp>
         <p:nvSpPr>
-          <p:cNvPr id="41" name="Text Placeholder 40">
-            <a:extLst>
-              <a:ext uri="{FF2B5EF4-FFF2-40B4-BE49-F238E27FC236}">
-                <a16:creationId xmlns:a16="http://schemas.microsoft.com/office/drawing/2014/main" id="{91181F6D-A54F-4289-8C36-80ECE3B2C8E2}"/>
+          <p:cNvPr id="47" name="Rectangle 46">
+            <a:extLst>
+              <a:ext uri="{FF2B5EF4-FFF2-40B4-BE49-F238E27FC236}">
+                <a16:creationId xmlns:a16="http://schemas.microsoft.com/office/drawing/2014/main" id="{88392DC7-0988-443B-A0D0-E726C7DB622B}"/>
+              </a:ext>
+              <a:ext uri="{C183D7F6-B498-43B3-948B-1728B52AA6E4}">
+                <adec:decorative xmlns:adec="http://schemas.microsoft.com/office/drawing/2017/decorative" val="1"/>
               </a:ext>
             </a:extLst>
           </p:cNvPr>
           <p:cNvSpPr>
-            <a:spLocks noGrp="1"/>
+            <a:spLocks noGrp="1" noRot="1" noChangeAspect="1" noMove="1" noResize="1" noEditPoints="1" noAdjustHandles="1" noChangeArrowheads="1" noChangeShapeType="1" noTextEdit="1"/>
           </p:cNvSpPr>
           <p:nvPr>
-            <p:ph type="body" sz="quarter" idx="18"/>
+            <p:extLst>
+              <p:ext uri="{386F3935-93C4-4BCD-93E2-E3B085C9AB24}">
+                <p16:designElem xmlns:p16="http://schemas.microsoft.com/office/powerpoint/2015/main" val="1"/>
+              </p:ext>
+            </p:extLst>
           </p:nvPr>
         </p:nvSpPr>
         <p:spPr>
           <a:xfrm>
-            <a:off x="1079500" y="3781425"/>
-            <a:ext cx="1711325" cy="365760"/>
+            <a:off x="0" y="2083435"/>
+            <a:ext cx="12192000" cy="4774564"/>
           </a:xfrm>
+          <a:prstGeom prst="rect">
+            <a:avLst/>
+          </a:prstGeom>
+          <a:solidFill>
+            <a:schemeClr val="bg2">
+              <a:lumMod val="10000"/>
+              <a:lumOff val="90000"/>
+              <a:alpha val="5000"/>
+            </a:schemeClr>
+          </a:solidFill>
+          <a:ln>
+            <a:noFill/>
+          </a:ln>
         </p:spPr>
+        <p:style>
+          <a:lnRef idx="2">
+            <a:schemeClr val="accent1">
+              <a:shade val="50000"/>
+            </a:schemeClr>
+          </a:lnRef>
+          <a:fillRef idx="1">
+            <a:schemeClr val="accent1"/>
+          </a:fillRef>
+          <a:effectRef idx="0">
+            <a:schemeClr val="accent1"/>
+          </a:effectRef>
+          <a:fontRef idx="minor">
+            <a:schemeClr val="lt1"/>
+          </a:fontRef>
+        </p:style>
         <p:txBody>
-          <a:bodyPr/>
+          <a:bodyPr rtlCol="0" anchor="ctr"/>
           <a:lstStyle/>
           <a:p>
-            <a:r>
-              <a:rPr lang="en-US" dirty="0"/>
-              <a:t>Name</a:t>
-            </a:r>
-          </a:p>
-        </p:txBody>
-      </p:sp>
-      <p:sp>
-        <p:nvSpPr>
-          <p:cNvPr id="15" name="Subtitle 14">
-            <a:extLst>
-              <a:ext uri="{FF2B5EF4-FFF2-40B4-BE49-F238E27FC236}">
-                <a16:creationId xmlns:a16="http://schemas.microsoft.com/office/drawing/2014/main" id="{84D39D81-9726-4BD7-BDC0-FA0B2AD0D219}"/>
-              </a:ext>
-            </a:extLst>
-          </p:cNvPr>
-          <p:cNvSpPr>
-            <a:spLocks noGrp="1"/>
-          </p:cNvSpPr>
-          <p:nvPr>
-            <p:ph type="body" sz="quarter" idx="17"/>
-          </p:nvPr>
-        </p:nvSpPr>
-        <p:spPr>
-          <a:xfrm>
-            <a:off x="1078733" y="4232949"/>
-            <a:ext cx="1711572" cy="638175"/>
-          </a:xfrm>
-        </p:spPr>
-        <p:txBody>
-          <a:bodyPr/>
-          <a:lstStyle/>
-          <a:p>
-            <a:r>
-              <a:rPr lang="en-US" dirty="0"/>
-              <a:t>Title</a:t>
-            </a:r>
-          </a:p>
-        </p:txBody>
-      </p:sp>
-      <p:sp>
-        <p:nvSpPr>
-          <p:cNvPr id="43" name="Text Placeholder 42">
-            <a:extLst>
-              <a:ext uri="{FF2B5EF4-FFF2-40B4-BE49-F238E27FC236}">
-                <a16:creationId xmlns:a16="http://schemas.microsoft.com/office/drawing/2014/main" id="{E4387CED-5FBE-4AFF-B64D-975B5574F16F}"/>
-              </a:ext>
-            </a:extLst>
-          </p:cNvPr>
-          <p:cNvSpPr>
-            <a:spLocks noGrp="1"/>
-          </p:cNvSpPr>
-          <p:nvPr>
-            <p:ph type="body" sz="quarter" idx="20"/>
-          </p:nvPr>
-        </p:nvSpPr>
-        <p:spPr>
-          <a:xfrm>
-            <a:off x="3839151" y="3781425"/>
-            <a:ext cx="1711325" cy="365760"/>
-          </a:xfrm>
-        </p:spPr>
-        <p:txBody>
-          <a:bodyPr/>
-          <a:lstStyle/>
-          <a:p>
-            <a:r>
-              <a:rPr lang="en-US" dirty="0"/>
-              <a:t>Name</a:t>
-            </a:r>
-          </a:p>
-        </p:txBody>
-      </p:sp>
-      <p:sp>
-        <p:nvSpPr>
-          <p:cNvPr id="42" name="Text Placeholder 41">
-            <a:extLst>
-              <a:ext uri="{FF2B5EF4-FFF2-40B4-BE49-F238E27FC236}">
-                <a16:creationId xmlns:a16="http://schemas.microsoft.com/office/drawing/2014/main" id="{CCDF84CD-BC27-4182-9FBA-9D4FEED95410}"/>
-              </a:ext>
-            </a:extLst>
-          </p:cNvPr>
-          <p:cNvSpPr>
-            <a:spLocks noGrp="1"/>
-          </p:cNvSpPr>
-          <p:nvPr>
-            <p:ph type="body" sz="quarter" idx="19"/>
-          </p:nvPr>
-        </p:nvSpPr>
-        <p:spPr>
-          <a:xfrm>
-            <a:off x="3838384" y="4232949"/>
-            <a:ext cx="1711572" cy="638175"/>
-          </a:xfrm>
-        </p:spPr>
-        <p:txBody>
-          <a:bodyPr/>
-          <a:lstStyle/>
-          <a:p>
-            <a:r>
-              <a:rPr lang="en-US" dirty="0"/>
-              <a:t>Title</a:t>
-            </a:r>
-          </a:p>
-        </p:txBody>
-      </p:sp>
-      <p:sp>
-        <p:nvSpPr>
-          <p:cNvPr id="45" name="Text Placeholder 44">
-            <a:extLst>
-              <a:ext uri="{FF2B5EF4-FFF2-40B4-BE49-F238E27FC236}">
-                <a16:creationId xmlns:a16="http://schemas.microsoft.com/office/drawing/2014/main" id="{FE5CD03B-066A-46AF-8FB8-E8A78074ABEF}"/>
-              </a:ext>
-            </a:extLst>
-          </p:cNvPr>
-          <p:cNvSpPr>
-            <a:spLocks noGrp="1"/>
-          </p:cNvSpPr>
-          <p:nvPr>
-            <p:ph type="body" sz="quarter" idx="22"/>
-          </p:nvPr>
-        </p:nvSpPr>
-        <p:spPr>
-          <a:xfrm>
-            <a:off x="6662743" y="3781425"/>
-            <a:ext cx="1711325" cy="365760"/>
-          </a:xfrm>
-        </p:spPr>
-        <p:txBody>
-          <a:bodyPr/>
-          <a:lstStyle/>
-          <a:p>
-            <a:r>
-              <a:rPr lang="en-US" dirty="0"/>
-              <a:t>Name</a:t>
-            </a:r>
-          </a:p>
-        </p:txBody>
-      </p:sp>
-      <p:sp>
-        <p:nvSpPr>
-          <p:cNvPr id="44" name="Text Placeholder 43">
-            <a:extLst>
-              <a:ext uri="{FF2B5EF4-FFF2-40B4-BE49-F238E27FC236}">
-                <a16:creationId xmlns:a16="http://schemas.microsoft.com/office/drawing/2014/main" id="{10E83414-3440-46C7-8C07-7D073B69C422}"/>
-              </a:ext>
-            </a:extLst>
-          </p:cNvPr>
-          <p:cNvSpPr>
-            <a:spLocks noGrp="1"/>
-          </p:cNvSpPr>
-          <p:nvPr>
-            <p:ph type="body" sz="quarter" idx="21"/>
-          </p:nvPr>
-        </p:nvSpPr>
-        <p:spPr>
-          <a:xfrm>
-            <a:off x="6661976" y="4232949"/>
-            <a:ext cx="1711572" cy="638175"/>
-          </a:xfrm>
-        </p:spPr>
-        <p:txBody>
-          <a:bodyPr/>
-          <a:lstStyle/>
-          <a:p>
-            <a:r>
-              <a:rPr lang="en-US" dirty="0"/>
-              <a:t>Title</a:t>
-            </a:r>
-          </a:p>
-        </p:txBody>
-      </p:sp>
-      <p:sp>
-        <p:nvSpPr>
-          <p:cNvPr id="47" name="Text Placeholder 46">
-            <a:extLst>
-              <a:ext uri="{FF2B5EF4-FFF2-40B4-BE49-F238E27FC236}">
-                <a16:creationId xmlns:a16="http://schemas.microsoft.com/office/drawing/2014/main" id="{F4640D91-CB97-4FCC-8FEF-F4B22B844DC4}"/>
-              </a:ext>
-            </a:extLst>
-          </p:cNvPr>
-          <p:cNvSpPr>
-            <a:spLocks noGrp="1"/>
-          </p:cNvSpPr>
-          <p:nvPr>
-            <p:ph type="body" sz="quarter" idx="24"/>
-          </p:nvPr>
-        </p:nvSpPr>
-        <p:spPr>
-          <a:xfrm>
-            <a:off x="9433112" y="3787288"/>
-            <a:ext cx="1711325" cy="365760"/>
-          </a:xfrm>
-        </p:spPr>
-        <p:txBody>
-          <a:bodyPr/>
-          <a:lstStyle/>
-          <a:p>
-            <a:r>
-              <a:rPr lang="en-US" dirty="0"/>
-              <a:t>Name</a:t>
-            </a:r>
-          </a:p>
-        </p:txBody>
-      </p:sp>
-      <p:sp>
-        <p:nvSpPr>
-          <p:cNvPr id="3" name="Text Placeholder 2">
-            <a:extLst>
-              <a:ext uri="{FF2B5EF4-FFF2-40B4-BE49-F238E27FC236}">
-                <a16:creationId xmlns:a16="http://schemas.microsoft.com/office/drawing/2014/main" id="{B1C6A53C-7538-4FF9-BC09-EFC116FE7054}"/>
-              </a:ext>
-            </a:extLst>
-          </p:cNvPr>
-          <p:cNvSpPr>
-            <a:spLocks noGrp="1"/>
-          </p:cNvSpPr>
-          <p:nvPr>
-            <p:ph type="body" sz="quarter" idx="23"/>
-          </p:nvPr>
-        </p:nvSpPr>
-        <p:spPr>
-          <a:xfrm>
-            <a:off x="9432345" y="4238812"/>
-            <a:ext cx="1711572" cy="638175"/>
-          </a:xfrm>
-        </p:spPr>
-        <p:txBody>
-          <a:bodyPr/>
-          <a:lstStyle/>
-          <a:p>
-            <a:r>
-              <a:rPr lang="en-US" dirty="0"/>
-              <a:t>Title</a:t>
-            </a:r>
+            <a:pPr algn="ctr"/>
+            <a:endParaRPr lang="en-US"/>
           </a:p>
         </p:txBody>
       </p:sp>
@@ -17451,14 +20490,26 @@
           </a:xfrm>
         </p:spPr>
         <p:txBody>
-          <a:bodyPr/>
+          <a:bodyPr vert="horz" wrap="square" lIns="0" tIns="0" rIns="0" bIns="0" rtlCol="0" anchor="ctr">
+            <a:normAutofit/>
+          </a:bodyPr>
           <a:lstStyle/>
           <a:p>
+            <a:pPr>
+              <a:spcAft>
+                <a:spcPts val="600"/>
+              </a:spcAft>
+            </a:pPr>
             <a:r>
-              <a:rPr lang="en-US"/>
+              <a:rPr lang="en-US">
+                <a:solidFill>
+                  <a:schemeClr val="tx1">
+                    <a:alpha val="80000"/>
+                  </a:schemeClr>
+                </a:solidFill>
+              </a:rPr>
               <a:t>Tuesday, February 2, 20XX</a:t>
             </a:r>
-            <a:endParaRPr lang="en-US" dirty="0"/>
           </a:p>
         </p:txBody>
       </p:sp>
@@ -17485,11 +20536,27 @@
           </a:xfrm>
         </p:spPr>
         <p:txBody>
-          <a:bodyPr/>
+          <a:bodyPr vert="horz" wrap="square" lIns="0" tIns="0" rIns="0" bIns="0" rtlCol="0" anchor="ctr">
+            <a:normAutofit/>
+          </a:bodyPr>
           <a:lstStyle/>
           <a:p>
+            <a:pPr>
+              <a:spcAft>
+                <a:spcPts val="600"/>
+              </a:spcAft>
+            </a:pPr>
             <a:r>
-              <a:rPr lang="en-US"/>
+              <a:rPr lang="en-US" kern="1200">
+                <a:solidFill>
+                  <a:schemeClr val="tx1">
+                    <a:alpha val="80000"/>
+                  </a:schemeClr>
+                </a:solidFill>
+                <a:latin typeface="+mn-lt"/>
+                <a:ea typeface="+mn-ea"/>
+                <a:cs typeface="+mn-cs"/>
+              </a:rPr>
               <a:t>Sample Footer Text</a:t>
             </a:r>
           </a:p>
@@ -17518,18 +20585,69 @@
           </a:xfrm>
         </p:spPr>
         <p:txBody>
-          <a:bodyPr/>
+          <a:bodyPr vert="horz" wrap="square" lIns="0" tIns="0" rIns="0" bIns="0" rtlCol="0" anchor="ctr">
+            <a:normAutofit/>
+          </a:bodyPr>
           <a:lstStyle/>
           <a:p>
+            <a:pPr>
+              <a:spcAft>
+                <a:spcPts val="600"/>
+              </a:spcAft>
+            </a:pPr>
             <a:fld id="{DBA1B0FB-D917-4C8C-928F-313BD683BF39}" type="slidenum">
-              <a:rPr lang="en-US" smtClean="0"/>
-              <a:pPr/>
+              <a:rPr lang="en-US" smtClean="0">
+                <a:solidFill>
+                  <a:schemeClr val="tx1">
+                    <a:alpha val="80000"/>
+                  </a:schemeClr>
+                </a:solidFill>
+              </a:rPr>
+              <a:pPr>
+                <a:spcAft>
+                  <a:spcPts val="600"/>
+                </a:spcAft>
+              </a:pPr>
               <a:t>8</a:t>
             </a:fld>
-            <a:endParaRPr lang="en-US"/>
+            <a:endParaRPr lang="en-US">
+              <a:solidFill>
+                <a:schemeClr val="tx1">
+                  <a:alpha val="80000"/>
+                </a:schemeClr>
+              </a:solidFill>
+            </a:endParaRPr>
           </a:p>
         </p:txBody>
       </p:sp>
+      <p:graphicFrame>
+        <p:nvGraphicFramePr>
+          <p:cNvPr id="35" name="TextBox 32">
+            <a:extLst>
+              <a:ext uri="{FF2B5EF4-FFF2-40B4-BE49-F238E27FC236}">
+                <a16:creationId xmlns:a16="http://schemas.microsoft.com/office/drawing/2014/main" id="{1E58266F-0F83-AF3E-A1E7-530A354701C0}"/>
+              </a:ext>
+            </a:extLst>
+          </p:cNvPr>
+          <p:cNvGraphicFramePr/>
+          <p:nvPr>
+            <p:extLst>
+              <p:ext uri="{D42A27DB-BD31-4B8C-83A1-F6EECF244321}">
+                <p14:modId xmlns:p14="http://schemas.microsoft.com/office/powerpoint/2010/main" val="3317306289"/>
+              </p:ext>
+            </p:extLst>
+          </p:nvPr>
+        </p:nvGraphicFramePr>
+        <p:xfrm>
+          <a:off x="550863" y="2624135"/>
+          <a:ext cx="11090276" cy="3468690"/>
+        </p:xfrm>
+        <a:graphic>
+          <a:graphicData uri="http://schemas.openxmlformats.org/drawingml/2006/diagram">
+            <dgm:relIds xmlns:dgm="http://schemas.openxmlformats.org/drawingml/2006/diagram" xmlns:r="http://schemas.openxmlformats.org/officeDocument/2006/relationships" r:dm="rId3" r:lo="rId4" r:qs="rId5" r:cs="rId6"/>
+          </a:graphicData>
+        </a:graphic>
+      </p:graphicFrame>
     </p:spTree>
     <p:extLst>
       <p:ext uri="{BB962C8B-B14F-4D97-AF65-F5344CB8AC3E}">
@@ -17925,73 +21043,6 @@
       </p:sp>
       <p:sp>
         <p:nvSpPr>
-          <p:cNvPr id="9" name="Text Placeholder 8">
-            <a:extLst>
-              <a:ext uri="{FF2B5EF4-FFF2-40B4-BE49-F238E27FC236}">
-                <a16:creationId xmlns:a16="http://schemas.microsoft.com/office/drawing/2014/main" id="{0D098C43-2F2A-4100-89BC-5931039293FA}"/>
-              </a:ext>
-            </a:extLst>
-          </p:cNvPr>
-          <p:cNvSpPr>
-            <a:spLocks noGrp="1"/>
-          </p:cNvSpPr>
-          <p:nvPr>
-            <p:ph type="body" idx="1"/>
-          </p:nvPr>
-        </p:nvSpPr>
-        <p:spPr>
-          <a:xfrm>
-            <a:off x="550864" y="1731375"/>
-            <a:ext cx="5437186" cy="535354"/>
-          </a:xfrm>
-        </p:spPr>
-        <p:txBody>
-          <a:bodyPr/>
-          <a:lstStyle/>
-          <a:p>
-            <a:r>
-              <a:rPr lang="en-US"/>
-              <a:t>Subtitle</a:t>
-            </a:r>
-            <a:endParaRPr lang="en-US" dirty="0"/>
-          </a:p>
-        </p:txBody>
-      </p:sp>
-      <p:sp>
-        <p:nvSpPr>
-          <p:cNvPr id="11" name="Text Placeholder 10">
-            <a:extLst>
-              <a:ext uri="{FF2B5EF4-FFF2-40B4-BE49-F238E27FC236}">
-                <a16:creationId xmlns:a16="http://schemas.microsoft.com/office/drawing/2014/main" id="{60726BA7-44D6-4116-90E3-38325026EAAD}"/>
-              </a:ext>
-            </a:extLst>
-          </p:cNvPr>
-          <p:cNvSpPr>
-            <a:spLocks noGrp="1"/>
-          </p:cNvSpPr>
-          <p:nvPr>
-            <p:ph type="body" sz="quarter" idx="3"/>
-          </p:nvPr>
-        </p:nvSpPr>
-        <p:spPr>
-          <a:xfrm>
-            <a:off x="6212024" y="1731375"/>
-            <a:ext cx="5436392" cy="535354"/>
-          </a:xfrm>
-        </p:spPr>
-        <p:txBody>
-          <a:bodyPr/>
-          <a:lstStyle/>
-          <a:p>
-            <a:r>
-              <a:rPr lang="en-US" dirty="0"/>
-              <a:t>Subtitle</a:t>
-            </a:r>
-          </a:p>
-        </p:txBody>
-      </p:sp>
-      <p:sp>
-        <p:nvSpPr>
           <p:cNvPr id="4" name="Date Placeholder 3">
             <a:extLst>
               <a:ext uri="{FF2B5EF4-FFF2-40B4-BE49-F238E27FC236}">
@@ -18253,56 +21304,35 @@
           </a:p>
         </p:txBody>
       </p:sp>
-      <p:sp>
-        <p:nvSpPr>
-          <p:cNvPr id="3" name="Content Placeholder 2">
-            <a:extLst>
-              <a:ext uri="{FF2B5EF4-FFF2-40B4-BE49-F238E27FC236}">
-                <a16:creationId xmlns:a16="http://schemas.microsoft.com/office/drawing/2014/main" id="{36953EB4-D26B-37B9-4DBD-73FECA6F5A27}"/>
-              </a:ext>
-            </a:extLst>
-          </p:cNvPr>
-          <p:cNvSpPr>
-            <a:spLocks noGrp="1"/>
-          </p:cNvSpPr>
+      <p:pic>
+        <p:nvPicPr>
+          <p:cNvPr id="8" name="Content Placeholder 7" descr="Chart&#10;&#10;Description automatically generated">
+            <a:extLst>
+              <a:ext uri="{FF2B5EF4-FFF2-40B4-BE49-F238E27FC236}">
+                <a16:creationId xmlns:a16="http://schemas.microsoft.com/office/drawing/2014/main" id="{92F21A9C-188E-4826-6A9B-2B2E621E8BC5}"/>
+              </a:ext>
+            </a:extLst>
+          </p:cNvPr>
+          <p:cNvPicPr>
+            <a:picLocks noGrp="1" noChangeAspect="1"/>
+          </p:cNvPicPr>
           <p:nvPr>
             <p:ph sz="half" idx="2"/>
           </p:nvPr>
-        </p:nvSpPr>
-        <p:spPr/>
-        <p:txBody>
-          <a:bodyPr/>
-          <a:lstStyle/>
-          <a:p>
-            <a:endParaRPr lang="en-US"/>
-          </a:p>
-        </p:txBody>
-      </p:sp>
-      <p:sp>
-        <p:nvSpPr>
-          <p:cNvPr id="13" name="Content Placeholder 12">
-            <a:extLst>
-              <a:ext uri="{FF2B5EF4-FFF2-40B4-BE49-F238E27FC236}">
-                <a16:creationId xmlns:a16="http://schemas.microsoft.com/office/drawing/2014/main" id="{1D01E234-49A9-2B88-0F6D-952522A82746}"/>
-              </a:ext>
-            </a:extLst>
-          </p:cNvPr>
-          <p:cNvSpPr>
-            <a:spLocks noGrp="1"/>
-          </p:cNvSpPr>
-          <p:nvPr>
-            <p:ph sz="quarter" idx="4"/>
-          </p:nvPr>
-        </p:nvSpPr>
-        <p:spPr/>
-        <p:txBody>
-          <a:bodyPr/>
-          <a:lstStyle/>
-          <a:p>
-            <a:endParaRPr lang="en-US"/>
-          </a:p>
-        </p:txBody>
-      </p:sp>
+        </p:nvPicPr>
+        <p:blipFill>
+          <a:blip r:embed="rId3"/>
+          <a:stretch>
+            <a:fillRect/>
+          </a:stretch>
+        </p:blipFill>
+        <p:spPr>
+          <a:xfrm>
+            <a:off x="550862" y="2514600"/>
+            <a:ext cx="11097551" cy="3000374"/>
+          </a:xfrm>
+        </p:spPr>
+      </p:pic>
     </p:spTree>
     <p:extLst>
       <p:ext uri="{BB962C8B-B14F-4D97-AF65-F5344CB8AC3E}">
@@ -19108,6 +22138,15 @@
 </file>
 
 <file path=customXml/item1.xml><?xml version="1.0" encoding="utf-8"?>
+<?mso-contentType ?>
+<FormTemplates xmlns="http://schemas.microsoft.com/sharepoint/v3/contenttype/forms">
+  <Display>DocumentLibraryForm</Display>
+  <Edit>DocumentLibraryForm</Edit>
+  <New>DocumentLibraryForm</New>
+</FormTemplates>
+</file>
+
+<file path=customXml/item2.xml><?xml version="1.0" encoding="utf-8"?>
 <p:properties xmlns:p="http://schemas.microsoft.com/office/2006/metadata/properties" xmlns:xsi="http://www.w3.org/2001/XMLSchema-instance" xmlns:pc="http://schemas.microsoft.com/office/infopath/2007/PartnerControls">
   <documentManagement>
     <_ip_UnifiedCompliancePolicyUIAction xmlns="http://schemas.microsoft.com/sharepoint/v3" xsi:nil="true"/>
@@ -19124,15 +22163,6 @@
     <MediaServiceKeyPoints xmlns="71af3243-3dd4-4a8d-8c0d-dd76da1f02a5" xsi:nil="true"/>
   </documentManagement>
 </p:properties>
-</file>
-
-<file path=customXml/item2.xml><?xml version="1.0" encoding="utf-8"?>
-<?mso-contentType ?>
-<FormTemplates xmlns="http://schemas.microsoft.com/sharepoint/v3/contenttype/forms">
-  <Display>DocumentLibraryForm</Display>
-  <Edit>DocumentLibraryForm</Edit>
-  <New>DocumentLibraryForm</New>
-</FormTemplates>
 </file>
 
 <file path=customXml/item3.xml><?xml version="1.0" encoding="utf-8"?>
@@ -19412,6 +22442,14 @@
 </file>
 
 <file path=customXml/itemProps1.xml><?xml version="1.0" encoding="utf-8"?>
+<ds:datastoreItem xmlns:ds="http://schemas.openxmlformats.org/officeDocument/2006/customXml" ds:itemID="{904751AB-E840-446F-8D49-E697067EC887}">
+  <ds:schemaRefs>
+    <ds:schemaRef ds:uri="http://schemas.microsoft.com/sharepoint/v3/contenttype/forms"/>
+  </ds:schemaRefs>
+</ds:datastoreItem>
+</file>
+
+<file path=customXml/itemProps2.xml><?xml version="1.0" encoding="utf-8"?>
 <ds:datastoreItem xmlns:ds="http://schemas.openxmlformats.org/officeDocument/2006/customXml" ds:itemID="{50811A92-D464-4AC4-A396-BA73B10CEEAC}">
   <ds:schemaRefs>
     <ds:schemaRef ds:uri="http://schemas.microsoft.com/office/2006/metadata/properties"/>
@@ -19419,14 +22457,6 @@
     <ds:schemaRef ds:uri="http://schemas.microsoft.com/sharepoint/v3"/>
     <ds:schemaRef ds:uri="71af3243-3dd4-4a8d-8c0d-dd76da1f02a5"/>
     <ds:schemaRef ds:uri="230e9df3-be65-4c73-a93b-d1236ebd677e"/>
-  </ds:schemaRefs>
-</ds:datastoreItem>
-</file>
-
-<file path=customXml/itemProps2.xml><?xml version="1.0" encoding="utf-8"?>
-<ds:datastoreItem xmlns:ds="http://schemas.openxmlformats.org/officeDocument/2006/customXml" ds:itemID="{904751AB-E840-446F-8D49-E697067EC887}">
-  <ds:schemaRefs>
-    <ds:schemaRef ds:uri="http://schemas.microsoft.com/sharepoint/v3/contenttype/forms"/>
   </ds:schemaRefs>
 </ds:datastoreItem>
 </file>

</xml_diff>